<commit_message>
BAME slides updaides update
</commit_message>
<xml_diff>
--- a/BAME walkthrough [Auto-saved].pptx
+++ b/BAME walkthrough [Auto-saved].pptx
@@ -5,10 +5,13 @@
     <p:sldMasterId id="2147483648" r:id="rId1"/>
   </p:sldMasterIdLst>
   <p:notesMasterIdLst>
-    <p:notesMasterId r:id="rId3"/>
+    <p:notesMasterId r:id="rId6"/>
   </p:notesMasterIdLst>
   <p:sldIdLst>
     <p:sldId id="256" r:id="rId2"/>
+    <p:sldId id="257" r:id="rId3"/>
+    <p:sldId id="259" r:id="rId4"/>
+    <p:sldId id="258" r:id="rId5"/>
   </p:sldIdLst>
   <p:sldSz cx="12192000" cy="6858000"/>
   <p:notesSz cx="6858000" cy="9144000"/>
@@ -197,7 +200,7 @@
           <a:p>
             <a:fld id="{439DAA85-5411-AC4E-AA6B-FE9B24DF832F}" type="datetimeFigureOut">
               <a:rPr lang="en-US" smtClean="0"/>
-              <a:t>6/2/20</a:t>
+              <a:t>6/4/20</a:t>
             </a:fld>
             <a:endParaRPr lang="en-US"/>
           </a:p>
@@ -579,6 +582,492 @@
 </p:notes>
 </file>
 
+<file path=ppt/notesSlides/notesSlide2.xml><?xml version="1.0" encoding="utf-8"?>
+<p:notes xmlns:a="http://schemas.openxmlformats.org/drawingml/2006/main" xmlns:r="http://schemas.openxmlformats.org/officeDocument/2006/relationships" xmlns:p="http://schemas.openxmlformats.org/presentationml/2006/main">
+  <p:cSld>
+    <p:spTree>
+      <p:nvGrpSpPr>
+        <p:cNvPr id="1" name=""/>
+        <p:cNvGrpSpPr/>
+        <p:nvPr/>
+      </p:nvGrpSpPr>
+      <p:grpSpPr>
+        <a:xfrm>
+          <a:off x="0" y="0"/>
+          <a:ext cx="0" cy="0"/>
+          <a:chOff x="0" y="0"/>
+          <a:chExt cx="0" cy="0"/>
+        </a:xfrm>
+      </p:grpSpPr>
+      <p:sp>
+        <p:nvSpPr>
+          <p:cNvPr id="2" name="Slide Image Placeholder 1"/>
+          <p:cNvSpPr>
+            <a:spLocks noGrp="1" noRot="1" noChangeAspect="1"/>
+          </p:cNvSpPr>
+          <p:nvPr>
+            <p:ph type="sldImg"/>
+          </p:nvPr>
+        </p:nvSpPr>
+        <p:spPr/>
+      </p:sp>
+      <p:sp>
+        <p:nvSpPr>
+          <p:cNvPr id="3" name="Notes Placeholder 2"/>
+          <p:cNvSpPr>
+            <a:spLocks noGrp="1"/>
+          </p:cNvSpPr>
+          <p:nvPr>
+            <p:ph type="body" idx="1"/>
+          </p:nvPr>
+        </p:nvSpPr>
+        <p:spPr/>
+        <p:txBody>
+          <a:bodyPr/>
+          <a:lstStyle/>
+          <a:p>
+            <a:r>
+              <a:rPr lang="en-US" dirty="0"/>
+              <a:t>Different indicators are available for different dates, be careful to note which data are for which dates.</a:t>
+            </a:r>
+          </a:p>
+          <a:p>
+            <a:endParaRPr lang="en-US" dirty="0"/>
+          </a:p>
+          <a:p>
+            <a:r>
+              <a:rPr lang="en-US" dirty="0"/>
+              <a:t>Raw data for the age </a:t>
+            </a:r>
+            <a:r>
+              <a:rPr lang="en-US" dirty="0" err="1"/>
+              <a:t>standardised</a:t>
+            </a:r>
+            <a:r>
+              <a:rPr lang="en-US" dirty="0"/>
+              <a:t> diagnosis rates are unavailable to recreate the figure, so this has been copied verbatim from the disparities in the risk and outcomes from COVID-19 report.</a:t>
+            </a:r>
+          </a:p>
+          <a:p>
+            <a:endParaRPr lang="en-US" dirty="0"/>
+          </a:p>
+          <a:p>
+            <a:r>
+              <a:rPr lang="en-GB" sz="1200" kern="1200" dirty="0">
+                <a:solidFill>
+                  <a:schemeClr val="tx1"/>
+                </a:solidFill>
+                <a:effectLst/>
+                <a:latin typeface="+mn-lt"/>
+                <a:ea typeface="+mn-ea"/>
+                <a:cs typeface="+mn-cs"/>
+              </a:rPr>
+              <a:t>Rates are not adjusted for some factors that may influence the likelihood of becoming infected, such as geographical location. The rates in the Other ethnic group are likely to be an overestimate due to the difference in the method of allocating ethnicity codes to the cases data and the population data used to calculate the rates. </a:t>
+            </a:r>
+            <a:endParaRPr lang="en-GB" dirty="0"/>
+          </a:p>
+          <a:p>
+            <a:endParaRPr lang="en-US" dirty="0"/>
+          </a:p>
+        </p:txBody>
+      </p:sp>
+      <p:sp>
+        <p:nvSpPr>
+          <p:cNvPr id="4" name="Slide Number Placeholder 3"/>
+          <p:cNvSpPr>
+            <a:spLocks noGrp="1"/>
+          </p:cNvSpPr>
+          <p:nvPr>
+            <p:ph type="sldNum" sz="quarter" idx="5"/>
+          </p:nvPr>
+        </p:nvSpPr>
+        <p:spPr/>
+        <p:txBody>
+          <a:bodyPr/>
+          <a:lstStyle/>
+          <a:p>
+            <a:fld id="{511866AC-D446-794A-AA4D-717ADD805424}" type="slidenum">
+              <a:rPr lang="en-US" smtClean="0"/>
+              <a:t>2</a:t>
+            </a:fld>
+            <a:endParaRPr lang="en-US"/>
+          </a:p>
+        </p:txBody>
+      </p:sp>
+    </p:spTree>
+    <p:extLst>
+      <p:ext uri="{BB962C8B-B14F-4D97-AF65-F5344CB8AC3E}">
+        <p14:creationId xmlns:p14="http://schemas.microsoft.com/office/powerpoint/2010/main" val="3519947407"/>
+      </p:ext>
+    </p:extLst>
+  </p:cSld>
+  <p:clrMapOvr>
+    <a:masterClrMapping/>
+  </p:clrMapOvr>
+</p:notes>
+</file>
+
+<file path=ppt/notesSlides/notesSlide3.xml><?xml version="1.0" encoding="utf-8"?>
+<p:notes xmlns:a="http://schemas.openxmlformats.org/drawingml/2006/main" xmlns:r="http://schemas.openxmlformats.org/officeDocument/2006/relationships" xmlns:p="http://schemas.openxmlformats.org/presentationml/2006/main">
+  <p:cSld>
+    <p:spTree>
+      <p:nvGrpSpPr>
+        <p:cNvPr id="1" name=""/>
+        <p:cNvGrpSpPr/>
+        <p:nvPr/>
+      </p:nvGrpSpPr>
+      <p:grpSpPr>
+        <a:xfrm>
+          <a:off x="0" y="0"/>
+          <a:ext cx="0" cy="0"/>
+          <a:chOff x="0" y="0"/>
+          <a:chExt cx="0" cy="0"/>
+        </a:xfrm>
+      </p:grpSpPr>
+      <p:sp>
+        <p:nvSpPr>
+          <p:cNvPr id="2" name="Slide Image Placeholder 1"/>
+          <p:cNvSpPr>
+            <a:spLocks noGrp="1" noRot="1" noChangeAspect="1"/>
+          </p:cNvSpPr>
+          <p:nvPr>
+            <p:ph type="sldImg"/>
+          </p:nvPr>
+        </p:nvSpPr>
+        <p:spPr/>
+      </p:sp>
+      <p:sp>
+        <p:nvSpPr>
+          <p:cNvPr id="3" name="Notes Placeholder 2"/>
+          <p:cNvSpPr>
+            <a:spLocks noGrp="1"/>
+          </p:cNvSpPr>
+          <p:nvPr>
+            <p:ph type="body" idx="1"/>
+          </p:nvPr>
+        </p:nvSpPr>
+        <p:spPr/>
+        <p:txBody>
+          <a:bodyPr/>
+          <a:lstStyle/>
+          <a:p>
+            <a:r>
+              <a:rPr lang="en-US" dirty="0"/>
+              <a:t>Data on ethnicity missing for 91% of total patients</a:t>
+            </a:r>
+          </a:p>
+        </p:txBody>
+      </p:sp>
+      <p:sp>
+        <p:nvSpPr>
+          <p:cNvPr id="4" name="Slide Number Placeholder 3"/>
+          <p:cNvSpPr>
+            <a:spLocks noGrp="1"/>
+          </p:cNvSpPr>
+          <p:nvPr>
+            <p:ph type="sldNum" sz="quarter" idx="5"/>
+          </p:nvPr>
+        </p:nvSpPr>
+        <p:spPr/>
+        <p:txBody>
+          <a:bodyPr/>
+          <a:lstStyle/>
+          <a:p>
+            <a:fld id="{511866AC-D446-794A-AA4D-717ADD805424}" type="slidenum">
+              <a:rPr lang="en-US" smtClean="0"/>
+              <a:t>3</a:t>
+            </a:fld>
+            <a:endParaRPr lang="en-US"/>
+          </a:p>
+        </p:txBody>
+      </p:sp>
+    </p:spTree>
+    <p:extLst>
+      <p:ext uri="{BB962C8B-B14F-4D97-AF65-F5344CB8AC3E}">
+        <p14:creationId xmlns:p14="http://schemas.microsoft.com/office/powerpoint/2010/main" val="89586579"/>
+      </p:ext>
+    </p:extLst>
+  </p:cSld>
+  <p:clrMapOvr>
+    <a:masterClrMapping/>
+  </p:clrMapOvr>
+</p:notes>
+</file>
+
+<file path=ppt/notesSlides/notesSlide4.xml><?xml version="1.0" encoding="utf-8"?>
+<p:notes xmlns:a="http://schemas.openxmlformats.org/drawingml/2006/main" xmlns:r="http://schemas.openxmlformats.org/officeDocument/2006/relationships" xmlns:p="http://schemas.openxmlformats.org/presentationml/2006/main">
+  <p:cSld>
+    <p:spTree>
+      <p:nvGrpSpPr>
+        <p:cNvPr id="1" name=""/>
+        <p:cNvGrpSpPr/>
+        <p:nvPr/>
+      </p:nvGrpSpPr>
+      <p:grpSpPr>
+        <a:xfrm>
+          <a:off x="0" y="0"/>
+          <a:ext cx="0" cy="0"/>
+          <a:chOff x="0" y="0"/>
+          <a:chExt cx="0" cy="0"/>
+        </a:xfrm>
+      </p:grpSpPr>
+      <p:sp>
+        <p:nvSpPr>
+          <p:cNvPr id="2" name="Slide Image Placeholder 1"/>
+          <p:cNvSpPr>
+            <a:spLocks noGrp="1" noRot="1" noChangeAspect="1"/>
+          </p:cNvSpPr>
+          <p:nvPr>
+            <p:ph type="sldImg"/>
+          </p:nvPr>
+        </p:nvSpPr>
+        <p:spPr/>
+      </p:sp>
+      <p:sp>
+        <p:nvSpPr>
+          <p:cNvPr id="3" name="Notes Placeholder 2"/>
+          <p:cNvSpPr>
+            <a:spLocks noGrp="1"/>
+          </p:cNvSpPr>
+          <p:nvPr>
+            <p:ph type="body" idx="1"/>
+          </p:nvPr>
+        </p:nvSpPr>
+        <p:spPr/>
+        <p:txBody>
+          <a:bodyPr/>
+          <a:lstStyle/>
+          <a:p>
+            <a:pPr marL="0" marR="0" lvl="0" indent="0" algn="l" defTabSz="914400" rtl="0" eaLnBrk="1" fontAlgn="auto" latinLnBrk="0" hangingPunct="1">
+              <a:lnSpc>
+                <a:spcPct val="100000"/>
+              </a:lnSpc>
+              <a:spcBef>
+                <a:spcPts val="0"/>
+              </a:spcBef>
+              <a:spcAft>
+                <a:spcPts val="0"/>
+              </a:spcAft>
+              <a:buClrTx/>
+              <a:buSzTx/>
+              <a:buFontTx/>
+              <a:buNone/>
+              <a:tabLst/>
+              <a:defRPr/>
+            </a:pPr>
+            <a:r>
+              <a:rPr lang="en-GB" sz="1200" kern="1200" dirty="0">
+                <a:solidFill>
+                  <a:schemeClr val="tx1"/>
+                </a:solidFill>
+                <a:effectLst/>
+                <a:latin typeface="+mn-lt"/>
+                <a:ea typeface="+mn-ea"/>
+                <a:cs typeface="+mn-cs"/>
+              </a:rPr>
+              <a:t>The rates in the Other ethnic group are likely to be an overestimate due to the difference in the method of allocating ethnicity codes to the cases/mortality data and the population data used to calculate the rates. </a:t>
+            </a:r>
+          </a:p>
+          <a:p>
+            <a:pPr marL="0" marR="0" lvl="0" indent="0" algn="l" defTabSz="914400" rtl="0" eaLnBrk="1" fontAlgn="auto" latinLnBrk="0" hangingPunct="1">
+              <a:lnSpc>
+                <a:spcPct val="100000"/>
+              </a:lnSpc>
+              <a:spcBef>
+                <a:spcPts val="0"/>
+              </a:spcBef>
+              <a:spcAft>
+                <a:spcPts val="0"/>
+              </a:spcAft>
+              <a:buClrTx/>
+              <a:buSzTx/>
+              <a:buFontTx/>
+              <a:buNone/>
+              <a:tabLst/>
+              <a:defRPr/>
+            </a:pPr>
+            <a:endParaRPr lang="en-GB" sz="1200" kern="1200" dirty="0">
+              <a:solidFill>
+                <a:schemeClr val="tx1"/>
+              </a:solidFill>
+              <a:effectLst/>
+              <a:latin typeface="+mn-lt"/>
+              <a:ea typeface="+mn-ea"/>
+              <a:cs typeface="+mn-cs"/>
+            </a:endParaRPr>
+          </a:p>
+          <a:p>
+            <a:pPr marL="0" marR="0" lvl="0" indent="0" algn="l" defTabSz="914400" rtl="0" eaLnBrk="1" fontAlgn="auto" latinLnBrk="0" hangingPunct="1">
+              <a:lnSpc>
+                <a:spcPct val="100000"/>
+              </a:lnSpc>
+              <a:spcBef>
+                <a:spcPts val="0"/>
+              </a:spcBef>
+              <a:spcAft>
+                <a:spcPts val="0"/>
+              </a:spcAft>
+              <a:buClrTx/>
+              <a:buSzTx/>
+              <a:buFontTx/>
+              <a:buNone/>
+              <a:tabLst/>
+              <a:defRPr/>
+            </a:pPr>
+            <a:r>
+              <a:rPr lang="en-GB" sz="1200" dirty="0">
+                <a:latin typeface="Calibri" panose="020F0502020204030204" pitchFamily="34" charset="0"/>
+                <a:cs typeface="Calibri" panose="020F0502020204030204" pitchFamily="34" charset="0"/>
+              </a:rPr>
+              <a:t>The survival analysis does not adjust for comorbidities and obesity, which are considered to have an impact on outcomes.</a:t>
+            </a:r>
+          </a:p>
+          <a:p>
+            <a:pPr marL="0" marR="0" lvl="0" indent="0" algn="l" defTabSz="914400" rtl="0" eaLnBrk="1" fontAlgn="auto" latinLnBrk="0" hangingPunct="1">
+              <a:lnSpc>
+                <a:spcPct val="100000"/>
+              </a:lnSpc>
+              <a:spcBef>
+                <a:spcPts val="0"/>
+              </a:spcBef>
+              <a:spcAft>
+                <a:spcPts val="0"/>
+              </a:spcAft>
+              <a:buClrTx/>
+              <a:buSzTx/>
+              <a:buFontTx/>
+              <a:buNone/>
+              <a:tabLst/>
+              <a:defRPr/>
+            </a:pPr>
+            <a:endParaRPr lang="en-GB" sz="1200" kern="1200" dirty="0">
+              <a:solidFill>
+                <a:schemeClr val="tx1"/>
+              </a:solidFill>
+              <a:effectLst/>
+              <a:latin typeface="+mn-lt"/>
+              <a:ea typeface="+mn-ea"/>
+              <a:cs typeface="+mn-cs"/>
+            </a:endParaRPr>
+          </a:p>
+          <a:p>
+            <a:pPr marL="0" marR="0" lvl="0" indent="0" algn="l" defTabSz="914400" rtl="0" eaLnBrk="1" fontAlgn="auto" latinLnBrk="0" hangingPunct="1">
+              <a:lnSpc>
+                <a:spcPct val="100000"/>
+              </a:lnSpc>
+              <a:spcBef>
+                <a:spcPts val="0"/>
+              </a:spcBef>
+              <a:spcAft>
+                <a:spcPts val="0"/>
+              </a:spcAft>
+              <a:buClrTx/>
+              <a:buSzTx/>
+              <a:buFontTx/>
+              <a:buNone/>
+              <a:tabLst/>
+              <a:defRPr/>
+            </a:pPr>
+            <a:r>
+              <a:rPr lang="en-GB" sz="1200" dirty="0">
+                <a:latin typeface="Calibri" panose="020F0502020204030204" pitchFamily="34" charset="0"/>
+                <a:cs typeface="Calibri" panose="020F0502020204030204" pitchFamily="34" charset="0"/>
+              </a:rPr>
+              <a:t>Excess mortality is the number of deaths by sex and ethnic group in the period 20 March to 7 May against the number of deaths that would be expected for corresponding dates in 2014 to 2018 </a:t>
+            </a:r>
+          </a:p>
+          <a:p>
+            <a:pPr marL="0" marR="0" lvl="0" indent="0" algn="l" defTabSz="914400" rtl="0" eaLnBrk="1" fontAlgn="auto" latinLnBrk="0" hangingPunct="1">
+              <a:lnSpc>
+                <a:spcPct val="100000"/>
+              </a:lnSpc>
+              <a:spcBef>
+                <a:spcPts val="0"/>
+              </a:spcBef>
+              <a:spcAft>
+                <a:spcPts val="0"/>
+              </a:spcAft>
+              <a:buClrTx/>
+              <a:buSzTx/>
+              <a:buFontTx/>
+              <a:buNone/>
+              <a:tabLst/>
+              <a:defRPr/>
+            </a:pPr>
+            <a:endParaRPr lang="en-GB" sz="1200" kern="1200" dirty="0">
+              <a:solidFill>
+                <a:schemeClr val="tx1"/>
+              </a:solidFill>
+              <a:effectLst/>
+              <a:latin typeface="+mn-lt"/>
+              <a:ea typeface="+mn-ea"/>
+              <a:cs typeface="+mn-cs"/>
+            </a:endParaRPr>
+          </a:p>
+          <a:p>
+            <a:pPr marL="0" marR="0" lvl="0" indent="0" algn="l" defTabSz="914400" rtl="0" eaLnBrk="1" fontAlgn="auto" latinLnBrk="0" hangingPunct="1">
+              <a:lnSpc>
+                <a:spcPct val="100000"/>
+              </a:lnSpc>
+              <a:spcBef>
+                <a:spcPts val="0"/>
+              </a:spcBef>
+              <a:spcAft>
+                <a:spcPts val="0"/>
+              </a:spcAft>
+              <a:buClrTx/>
+              <a:buSzTx/>
+              <a:buFontTx/>
+              <a:buNone/>
+              <a:tabLst/>
+              <a:defRPr/>
+            </a:pPr>
+            <a:endParaRPr lang="en-GB" dirty="0"/>
+          </a:p>
+          <a:p>
+            <a:endParaRPr lang="en-US" dirty="0"/>
+          </a:p>
+          <a:p>
+            <a:endParaRPr lang="en-US" dirty="0"/>
+          </a:p>
+        </p:txBody>
+      </p:sp>
+      <p:sp>
+        <p:nvSpPr>
+          <p:cNvPr id="4" name="Slide Number Placeholder 3"/>
+          <p:cNvSpPr>
+            <a:spLocks noGrp="1"/>
+          </p:cNvSpPr>
+          <p:nvPr>
+            <p:ph type="sldNum" sz="quarter" idx="5"/>
+          </p:nvPr>
+        </p:nvSpPr>
+        <p:spPr/>
+        <p:txBody>
+          <a:bodyPr/>
+          <a:lstStyle/>
+          <a:p>
+            <a:fld id="{511866AC-D446-794A-AA4D-717ADD805424}" type="slidenum">
+              <a:rPr lang="en-US" smtClean="0"/>
+              <a:t>4</a:t>
+            </a:fld>
+            <a:endParaRPr lang="en-US"/>
+          </a:p>
+        </p:txBody>
+      </p:sp>
+    </p:spTree>
+    <p:extLst>
+      <p:ext uri="{BB962C8B-B14F-4D97-AF65-F5344CB8AC3E}">
+        <p14:creationId xmlns:p14="http://schemas.microsoft.com/office/powerpoint/2010/main" val="71246037"/>
+      </p:ext>
+    </p:extLst>
+  </p:cSld>
+  <p:clrMapOvr>
+    <a:masterClrMapping/>
+  </p:clrMapOvr>
+</p:notes>
+</file>
+
 <file path=ppt/slideLayouts/slideLayout1.xml><?xml version="1.0" encoding="utf-8"?>
 <p:sldLayout xmlns:a="http://schemas.openxmlformats.org/drawingml/2006/main" xmlns:r="http://schemas.openxmlformats.org/officeDocument/2006/relationships" xmlns:p="http://schemas.openxmlformats.org/presentationml/2006/main" type="title" preserve="1">
   <p:cSld name="Title Slide">
@@ -728,7 +1217,7 @@
           <a:p>
             <a:fld id="{AC128770-6A5F-9043-805A-ACDF2D4D4846}" type="datetimeFigureOut">
               <a:rPr lang="en-US" smtClean="0"/>
-              <a:t>6/2/20</a:t>
+              <a:t>6/4/20</a:t>
             </a:fld>
             <a:endParaRPr lang="en-US"/>
           </a:p>
@@ -928,7 +1417,7 @@
           <a:p>
             <a:fld id="{AC128770-6A5F-9043-805A-ACDF2D4D4846}" type="datetimeFigureOut">
               <a:rPr lang="en-US" smtClean="0"/>
-              <a:t>6/2/20</a:t>
+              <a:t>6/4/20</a:t>
             </a:fld>
             <a:endParaRPr lang="en-US"/>
           </a:p>
@@ -1138,7 +1627,7 @@
           <a:p>
             <a:fld id="{AC128770-6A5F-9043-805A-ACDF2D4D4846}" type="datetimeFigureOut">
               <a:rPr lang="en-US" smtClean="0"/>
-              <a:t>6/2/20</a:t>
+              <a:t>6/4/20</a:t>
             </a:fld>
             <a:endParaRPr lang="en-US"/>
           </a:p>
@@ -1338,7 +1827,7 @@
           <a:p>
             <a:fld id="{AC128770-6A5F-9043-805A-ACDF2D4D4846}" type="datetimeFigureOut">
               <a:rPr lang="en-US" smtClean="0"/>
-              <a:t>6/2/20</a:t>
+              <a:t>6/4/20</a:t>
             </a:fld>
             <a:endParaRPr lang="en-US"/>
           </a:p>
@@ -1614,7 +2103,7 @@
           <a:p>
             <a:fld id="{AC128770-6A5F-9043-805A-ACDF2D4D4846}" type="datetimeFigureOut">
               <a:rPr lang="en-US" smtClean="0"/>
-              <a:t>6/2/20</a:t>
+              <a:t>6/4/20</a:t>
             </a:fld>
             <a:endParaRPr lang="en-US"/>
           </a:p>
@@ -1882,7 +2371,7 @@
           <a:p>
             <a:fld id="{AC128770-6A5F-9043-805A-ACDF2D4D4846}" type="datetimeFigureOut">
               <a:rPr lang="en-US" smtClean="0"/>
-              <a:t>6/2/20</a:t>
+              <a:t>6/4/20</a:t>
             </a:fld>
             <a:endParaRPr lang="en-US"/>
           </a:p>
@@ -2297,7 +2786,7 @@
           <a:p>
             <a:fld id="{AC128770-6A5F-9043-805A-ACDF2D4D4846}" type="datetimeFigureOut">
               <a:rPr lang="en-US" smtClean="0"/>
-              <a:t>6/2/20</a:t>
+              <a:t>6/4/20</a:t>
             </a:fld>
             <a:endParaRPr lang="en-US"/>
           </a:p>
@@ -2439,7 +2928,7 @@
           <a:p>
             <a:fld id="{AC128770-6A5F-9043-805A-ACDF2D4D4846}" type="datetimeFigureOut">
               <a:rPr lang="en-US" smtClean="0"/>
-              <a:t>6/2/20</a:t>
+              <a:t>6/4/20</a:t>
             </a:fld>
             <a:endParaRPr lang="en-US"/>
           </a:p>
@@ -2552,7 +3041,7 @@
           <a:p>
             <a:fld id="{AC128770-6A5F-9043-805A-ACDF2D4D4846}" type="datetimeFigureOut">
               <a:rPr lang="en-US" smtClean="0"/>
-              <a:t>6/2/20</a:t>
+              <a:t>6/4/20</a:t>
             </a:fld>
             <a:endParaRPr lang="en-US"/>
           </a:p>
@@ -2865,7 +3354,7 @@
           <a:p>
             <a:fld id="{AC128770-6A5F-9043-805A-ACDF2D4D4846}" type="datetimeFigureOut">
               <a:rPr lang="en-US" smtClean="0"/>
-              <a:t>6/2/20</a:t>
+              <a:t>6/4/20</a:t>
             </a:fld>
             <a:endParaRPr lang="en-US"/>
           </a:p>
@@ -3154,7 +3643,7 @@
           <a:p>
             <a:fld id="{AC128770-6A5F-9043-805A-ACDF2D4D4846}" type="datetimeFigureOut">
               <a:rPr lang="en-US" smtClean="0"/>
-              <a:t>6/2/20</a:t>
+              <a:t>6/4/20</a:t>
             </a:fld>
             <a:endParaRPr lang="en-US"/>
           </a:p>
@@ -3397,7 +3886,7 @@
           <a:p>
             <a:fld id="{AC128770-6A5F-9043-805A-ACDF2D4D4846}" type="datetimeFigureOut">
               <a:rPr lang="en-US" smtClean="0"/>
-              <a:t>6/2/20</a:t>
+              <a:t>6/4/20</a:t>
             </a:fld>
             <a:endParaRPr lang="en-US"/>
           </a:p>
@@ -15474,6 +15963,4077 @@
     <p:extLst>
       <p:ext uri="{BB962C8B-B14F-4D97-AF65-F5344CB8AC3E}">
         <p14:creationId xmlns:p14="http://schemas.microsoft.com/office/powerpoint/2010/main" val="1474685317"/>
+      </p:ext>
+    </p:extLst>
+  </p:cSld>
+  <p:clrMapOvr>
+    <a:masterClrMapping/>
+  </p:clrMapOvr>
+</p:sld>
+</file>
+
+<file path=ppt/slides/slide2.xml><?xml version="1.0" encoding="utf-8"?>
+<p:sld xmlns:a="http://schemas.openxmlformats.org/drawingml/2006/main" xmlns:r="http://schemas.openxmlformats.org/officeDocument/2006/relationships" xmlns:p="http://schemas.openxmlformats.org/presentationml/2006/main">
+  <p:cSld>
+    <p:spTree>
+      <p:nvGrpSpPr>
+        <p:cNvPr id="1" name=""/>
+        <p:cNvGrpSpPr/>
+        <p:nvPr/>
+      </p:nvGrpSpPr>
+      <p:grpSpPr>
+        <a:xfrm>
+          <a:off x="0" y="0"/>
+          <a:ext cx="0" cy="0"/>
+          <a:chOff x="0" y="0"/>
+          <a:chExt cx="0" cy="0"/>
+        </a:xfrm>
+      </p:grpSpPr>
+      <p:sp>
+        <p:nvSpPr>
+          <p:cNvPr id="4" name="Rectangle 3">
+            <a:extLst>
+              <a:ext uri="{FF2B5EF4-FFF2-40B4-BE49-F238E27FC236}">
+                <a16:creationId xmlns:a16="http://schemas.microsoft.com/office/drawing/2014/main" id="{C32DE01C-E9F5-0147-8A12-BF308C8AE3EB}"/>
+              </a:ext>
+            </a:extLst>
+          </p:cNvPr>
+          <p:cNvSpPr/>
+          <p:nvPr/>
+        </p:nvSpPr>
+        <p:spPr>
+          <a:xfrm>
+            <a:off x="7608" y="6627168"/>
+            <a:ext cx="6088392" cy="230832"/>
+          </a:xfrm>
+          <a:prstGeom prst="rect">
+            <a:avLst/>
+          </a:prstGeom>
+        </p:spPr>
+        <p:txBody>
+          <a:bodyPr wrap="square">
+            <a:spAutoFit/>
+          </a:bodyPr>
+          <a:lstStyle/>
+          <a:p>
+            <a:r>
+              <a:rPr lang="en-GB" sz="900" dirty="0">
+                <a:latin typeface="Calibri" panose="020F0502020204030204" pitchFamily="34" charset="0"/>
+                <a:cs typeface="Calibri" panose="020F0502020204030204" pitchFamily="34" charset="0"/>
+              </a:rPr>
+              <a:t>Pillar 1 (swab testing in PHE labs and NHS hospitals for those with a clinical need, and the most critical health and care workers) </a:t>
+            </a:r>
+            <a:endParaRPr lang="en-GB" sz="900" dirty="0">
+              <a:effectLst/>
+              <a:latin typeface="Calibri" panose="020F0502020204030204" pitchFamily="34" charset="0"/>
+              <a:cs typeface="Calibri" panose="020F0502020204030204" pitchFamily="34" charset="0"/>
+            </a:endParaRPr>
+          </a:p>
+        </p:txBody>
+      </p:sp>
+      <p:sp>
+        <p:nvSpPr>
+          <p:cNvPr id="5" name="Rectangle 4">
+            <a:extLst>
+              <a:ext uri="{FF2B5EF4-FFF2-40B4-BE49-F238E27FC236}">
+                <a16:creationId xmlns:a16="http://schemas.microsoft.com/office/drawing/2014/main" id="{B549D71B-9EEA-994A-8B53-D077FCDDE0B7}"/>
+              </a:ext>
+            </a:extLst>
+          </p:cNvPr>
+          <p:cNvSpPr/>
+          <p:nvPr/>
+        </p:nvSpPr>
+        <p:spPr>
+          <a:xfrm>
+            <a:off x="-7608" y="0"/>
+            <a:ext cx="12192000" cy="606582"/>
+          </a:xfrm>
+          <a:prstGeom prst="rect">
+            <a:avLst/>
+          </a:prstGeom>
+          <a:solidFill>
+            <a:srgbClr val="8E8E8E"/>
+          </a:solidFill>
+          <a:ln>
+            <a:solidFill>
+              <a:schemeClr val="tx2">
+                <a:lumMod val="20000"/>
+                <a:lumOff val="80000"/>
+              </a:schemeClr>
+            </a:solidFill>
+          </a:ln>
+        </p:spPr>
+        <p:style>
+          <a:lnRef idx="2">
+            <a:schemeClr val="accent1">
+              <a:shade val="50000"/>
+            </a:schemeClr>
+          </a:lnRef>
+          <a:fillRef idx="1">
+            <a:schemeClr val="accent1"/>
+          </a:fillRef>
+          <a:effectRef idx="0">
+            <a:schemeClr val="accent1"/>
+          </a:effectRef>
+          <a:fontRef idx="minor">
+            <a:schemeClr val="lt1"/>
+          </a:fontRef>
+        </p:style>
+        <p:txBody>
+          <a:bodyPr rtlCol="0" anchor="ctr"/>
+          <a:lstStyle/>
+          <a:p>
+            <a:pPr algn="ctr"/>
+            <a:endParaRPr lang="en-US" sz="800" dirty="0">
+              <a:latin typeface="Verdana" panose="020B0604030504040204" pitchFamily="34" charset="0"/>
+              <a:ea typeface="Verdana" panose="020B0604030504040204" pitchFamily="34" charset="0"/>
+              <a:cs typeface="Verdana" panose="020B0604030504040204" pitchFamily="34" charset="0"/>
+            </a:endParaRPr>
+          </a:p>
+        </p:txBody>
+      </p:sp>
+      <p:graphicFrame>
+        <p:nvGraphicFramePr>
+          <p:cNvPr id="8" name="Table 7">
+            <a:extLst>
+              <a:ext uri="{FF2B5EF4-FFF2-40B4-BE49-F238E27FC236}">
+                <a16:creationId xmlns:a16="http://schemas.microsoft.com/office/drawing/2014/main" id="{0E4FBD6E-7F7E-EE45-87ED-5C76DC64F986}"/>
+              </a:ext>
+            </a:extLst>
+          </p:cNvPr>
+          <p:cNvGraphicFramePr>
+            <a:graphicFrameLocks noGrp="1"/>
+          </p:cNvGraphicFramePr>
+          <p:nvPr>
+            <p:extLst>
+              <p:ext uri="{D42A27DB-BD31-4B8C-83A1-F6EECF244321}">
+                <p14:modId xmlns:p14="http://schemas.microsoft.com/office/powerpoint/2010/main" val="2656269166"/>
+              </p:ext>
+            </p:extLst>
+          </p:nvPr>
+        </p:nvGraphicFramePr>
+        <p:xfrm>
+          <a:off x="139413" y="2626939"/>
+          <a:ext cx="4432982" cy="1517382"/>
+        </p:xfrm>
+        <a:graphic>
+          <a:graphicData uri="http://schemas.openxmlformats.org/drawingml/2006/table">
+            <a:tbl>
+              <a:tblPr firstRow="1" bandRow="1">
+                <a:tableStyleId>{2D5ABB26-0587-4C30-8999-92F81FD0307C}</a:tableStyleId>
+              </a:tblPr>
+              <a:tblGrid>
+                <a:gridCol w="2148205">
+                  <a:extLst>
+                    <a:ext uri="{9D8B030D-6E8A-4147-A177-3AD203B41FA5}">
+                      <a16:colId xmlns:a16="http://schemas.microsoft.com/office/drawing/2014/main" val="3809931861"/>
+                    </a:ext>
+                  </a:extLst>
+                </a:gridCol>
+                <a:gridCol w="2284777">
+                  <a:extLst>
+                    <a:ext uri="{9D8B030D-6E8A-4147-A177-3AD203B41FA5}">
+                      <a16:colId xmlns:a16="http://schemas.microsoft.com/office/drawing/2014/main" val="3342461103"/>
+                    </a:ext>
+                  </a:extLst>
+                </a:gridCol>
+              </a:tblGrid>
+              <a:tr h="298182">
+                <a:tc>
+                  <a:txBody>
+                    <a:bodyPr/>
+                    <a:lstStyle/>
+                    <a:p>
+                      <a:r>
+                        <a:rPr lang="en-US" sz="1050" b="1" dirty="0"/>
+                        <a:t>Ethnicity</a:t>
+                      </a:r>
+                    </a:p>
+                  </a:txBody>
+                  <a:tcPr>
+                    <a:lnT w="12700" cap="flat" cmpd="sng" algn="ctr">
+                      <a:solidFill>
+                        <a:schemeClr val="tx1"/>
+                      </a:solidFill>
+                      <a:prstDash val="solid"/>
+                      <a:round/>
+                      <a:headEnd type="none" w="med" len="med"/>
+                      <a:tailEnd type="none" w="med" len="med"/>
+                    </a:lnT>
+                    <a:lnB w="12700" cap="flat" cmpd="sng" algn="ctr">
+                      <a:solidFill>
+                        <a:schemeClr val="tx1"/>
+                      </a:solidFill>
+                      <a:prstDash val="solid"/>
+                      <a:round/>
+                      <a:headEnd type="none" w="med" len="med"/>
+                      <a:tailEnd type="none" w="med" len="med"/>
+                    </a:lnB>
+                  </a:tcPr>
+                </a:tc>
+                <a:tc>
+                  <a:txBody>
+                    <a:bodyPr/>
+                    <a:lstStyle/>
+                    <a:p>
+                      <a:pPr algn="r"/>
+                      <a:r>
+                        <a:rPr lang="en-US" sz="1050" b="1" dirty="0"/>
+                        <a:t>Covid-19 proportion of cases</a:t>
+                      </a:r>
+                    </a:p>
+                  </a:txBody>
+                  <a:tcPr>
+                    <a:lnT w="12700" cap="flat" cmpd="sng" algn="ctr">
+                      <a:solidFill>
+                        <a:schemeClr val="tx1"/>
+                      </a:solidFill>
+                      <a:prstDash val="solid"/>
+                      <a:round/>
+                      <a:headEnd type="none" w="med" len="med"/>
+                      <a:tailEnd type="none" w="med" len="med"/>
+                    </a:lnT>
+                    <a:lnB w="12700" cap="flat" cmpd="sng" algn="ctr">
+                      <a:solidFill>
+                        <a:schemeClr val="tx1"/>
+                      </a:solidFill>
+                      <a:prstDash val="solid"/>
+                      <a:round/>
+                      <a:headEnd type="none" w="med" len="med"/>
+                      <a:tailEnd type="none" w="med" len="med"/>
+                    </a:lnB>
+                  </a:tcPr>
+                </a:tc>
+                <a:extLst>
+                  <a:ext uri="{0D108BD9-81ED-4DB2-BD59-A6C34878D82A}">
+                    <a16:rowId xmlns:a16="http://schemas.microsoft.com/office/drawing/2014/main" val="2791294743"/>
+                  </a:ext>
+                </a:extLst>
+              </a:tr>
+              <a:tr h="183496">
+                <a:tc>
+                  <a:txBody>
+                    <a:bodyPr/>
+                    <a:lstStyle/>
+                    <a:p>
+                      <a:r>
+                        <a:rPr lang="en-US" sz="1000" dirty="0"/>
+                        <a:t>White</a:t>
+                      </a:r>
+                    </a:p>
+                  </a:txBody>
+                  <a:tcPr>
+                    <a:lnT w="12700" cap="flat" cmpd="sng" algn="ctr">
+                      <a:solidFill>
+                        <a:schemeClr val="tx1"/>
+                      </a:solidFill>
+                      <a:prstDash val="solid"/>
+                      <a:round/>
+                      <a:headEnd type="none" w="med" len="med"/>
+                      <a:tailEnd type="none" w="med" len="med"/>
+                    </a:lnT>
+                  </a:tcPr>
+                </a:tc>
+                <a:tc>
+                  <a:txBody>
+                    <a:bodyPr/>
+                    <a:lstStyle/>
+                    <a:p>
+                      <a:pPr algn="r"/>
+                      <a:r>
+                        <a:rPr lang="en-US" sz="1000" dirty="0"/>
+                        <a:t>82.7%</a:t>
+                      </a:r>
+                    </a:p>
+                  </a:txBody>
+                  <a:tcPr>
+                    <a:lnT w="12700" cap="flat" cmpd="sng" algn="ctr">
+                      <a:solidFill>
+                        <a:schemeClr val="tx1"/>
+                      </a:solidFill>
+                      <a:prstDash val="solid"/>
+                      <a:round/>
+                      <a:headEnd type="none" w="med" len="med"/>
+                      <a:tailEnd type="none" w="med" len="med"/>
+                    </a:lnT>
+                  </a:tcPr>
+                </a:tc>
+                <a:extLst>
+                  <a:ext uri="{0D108BD9-81ED-4DB2-BD59-A6C34878D82A}">
+                    <a16:rowId xmlns:a16="http://schemas.microsoft.com/office/drawing/2014/main" val="163257512"/>
+                  </a:ext>
+                </a:extLst>
+              </a:tr>
+              <a:tr h="183496">
+                <a:tc>
+                  <a:txBody>
+                    <a:bodyPr/>
+                    <a:lstStyle/>
+                    <a:p>
+                      <a:r>
+                        <a:rPr lang="en-US" sz="1000" dirty="0"/>
+                        <a:t>Asian/Asian British</a:t>
+                      </a:r>
+                    </a:p>
+                  </a:txBody>
+                  <a:tcPr/>
+                </a:tc>
+                <a:tc>
+                  <a:txBody>
+                    <a:bodyPr/>
+                    <a:lstStyle/>
+                    <a:p>
+                      <a:pPr algn="r"/>
+                      <a:r>
+                        <a:rPr lang="en-US" sz="1000" dirty="0"/>
+                        <a:t>8.4%</a:t>
+                      </a:r>
+                    </a:p>
+                  </a:txBody>
+                  <a:tcPr/>
+                </a:tc>
+                <a:extLst>
+                  <a:ext uri="{0D108BD9-81ED-4DB2-BD59-A6C34878D82A}">
+                    <a16:rowId xmlns:a16="http://schemas.microsoft.com/office/drawing/2014/main" val="2588850950"/>
+                  </a:ext>
+                </a:extLst>
+              </a:tr>
+              <a:tr h="205090">
+                <a:tc>
+                  <a:txBody>
+                    <a:bodyPr/>
+                    <a:lstStyle/>
+                    <a:p>
+                      <a:r>
+                        <a:rPr lang="en-US" sz="1000" dirty="0"/>
+                        <a:t>Black/African/Caribbean/Black British</a:t>
+                      </a:r>
+                    </a:p>
+                  </a:txBody>
+                  <a:tcPr/>
+                </a:tc>
+                <a:tc>
+                  <a:txBody>
+                    <a:bodyPr/>
+                    <a:lstStyle/>
+                    <a:p>
+                      <a:pPr algn="r"/>
+                      <a:r>
+                        <a:rPr lang="en-US" sz="1000" dirty="0"/>
+                        <a:t>5.1%</a:t>
+                      </a:r>
+                    </a:p>
+                  </a:txBody>
+                  <a:tcPr/>
+                </a:tc>
+                <a:extLst>
+                  <a:ext uri="{0D108BD9-81ED-4DB2-BD59-A6C34878D82A}">
+                    <a16:rowId xmlns:a16="http://schemas.microsoft.com/office/drawing/2014/main" val="3074089005"/>
+                  </a:ext>
+                </a:extLst>
+              </a:tr>
+              <a:tr h="205090">
+                <a:tc>
+                  <a:txBody>
+                    <a:bodyPr/>
+                    <a:lstStyle/>
+                    <a:p>
+                      <a:r>
+                        <a:rPr lang="en-US" sz="1000" dirty="0"/>
+                        <a:t>Mixed/Multiple ethnic groups</a:t>
+                      </a:r>
+                    </a:p>
+                  </a:txBody>
+                  <a:tcPr/>
+                </a:tc>
+                <a:tc>
+                  <a:txBody>
+                    <a:bodyPr/>
+                    <a:lstStyle/>
+                    <a:p>
+                      <a:pPr algn="r"/>
+                      <a:r>
+                        <a:rPr lang="en-US" sz="1000" dirty="0"/>
+                        <a:t>1.1%</a:t>
+                      </a:r>
+                    </a:p>
+                  </a:txBody>
+                  <a:tcPr/>
+                </a:tc>
+                <a:extLst>
+                  <a:ext uri="{0D108BD9-81ED-4DB2-BD59-A6C34878D82A}">
+                    <a16:rowId xmlns:a16="http://schemas.microsoft.com/office/drawing/2014/main" val="1095389294"/>
+                  </a:ext>
+                </a:extLst>
+              </a:tr>
+              <a:tr h="0">
+                <a:tc>
+                  <a:txBody>
+                    <a:bodyPr/>
+                    <a:lstStyle/>
+                    <a:p>
+                      <a:r>
+                        <a:rPr lang="en-US" sz="1000" dirty="0"/>
+                        <a:t>Other ethnic groups</a:t>
+                      </a:r>
+                    </a:p>
+                  </a:txBody>
+                  <a:tcPr>
+                    <a:lnB w="12700" cap="flat" cmpd="sng" algn="ctr">
+                      <a:solidFill>
+                        <a:schemeClr val="tx1"/>
+                      </a:solidFill>
+                      <a:prstDash val="solid"/>
+                      <a:round/>
+                      <a:headEnd type="none" w="med" len="med"/>
+                      <a:tailEnd type="none" w="med" len="med"/>
+                    </a:lnB>
+                  </a:tcPr>
+                </a:tc>
+                <a:tc>
+                  <a:txBody>
+                    <a:bodyPr/>
+                    <a:lstStyle/>
+                    <a:p>
+                      <a:pPr algn="r"/>
+                      <a:r>
+                        <a:rPr lang="en-US" sz="1000" dirty="0"/>
+                        <a:t>2.8%</a:t>
+                      </a:r>
+                    </a:p>
+                  </a:txBody>
+                  <a:tcPr>
+                    <a:lnB w="12700" cap="flat" cmpd="sng" algn="ctr">
+                      <a:solidFill>
+                        <a:schemeClr val="tx1"/>
+                      </a:solidFill>
+                      <a:prstDash val="solid"/>
+                      <a:round/>
+                      <a:headEnd type="none" w="med" len="med"/>
+                      <a:tailEnd type="none" w="med" len="med"/>
+                    </a:lnB>
+                  </a:tcPr>
+                </a:tc>
+                <a:extLst>
+                  <a:ext uri="{0D108BD9-81ED-4DB2-BD59-A6C34878D82A}">
+                    <a16:rowId xmlns:a16="http://schemas.microsoft.com/office/drawing/2014/main" val="525719170"/>
+                  </a:ext>
+                </a:extLst>
+              </a:tr>
+            </a:tbl>
+          </a:graphicData>
+        </a:graphic>
+      </p:graphicFrame>
+      <p:sp>
+        <p:nvSpPr>
+          <p:cNvPr id="9" name="Rectangle 8">
+            <a:extLst>
+              <a:ext uri="{FF2B5EF4-FFF2-40B4-BE49-F238E27FC236}">
+                <a16:creationId xmlns:a16="http://schemas.microsoft.com/office/drawing/2014/main" id="{AA12ED0D-16AE-4146-929A-7A802BFF5490}"/>
+              </a:ext>
+            </a:extLst>
+          </p:cNvPr>
+          <p:cNvSpPr/>
+          <p:nvPr/>
+        </p:nvSpPr>
+        <p:spPr>
+          <a:xfrm>
+            <a:off x="139413" y="2153252"/>
+            <a:ext cx="4432982" cy="461665"/>
+          </a:xfrm>
+          <a:prstGeom prst="rect">
+            <a:avLst/>
+          </a:prstGeom>
+        </p:spPr>
+        <p:txBody>
+          <a:bodyPr wrap="square">
+            <a:spAutoFit/>
+          </a:bodyPr>
+          <a:lstStyle/>
+          <a:p>
+            <a:r>
+              <a:rPr lang="en-US" sz="1200" b="1" dirty="0"/>
+              <a:t>Cumulative proportion of confirmed (pillar 1) Covid-19 cases </a:t>
+            </a:r>
+          </a:p>
+          <a:p>
+            <a:r>
+              <a:rPr lang="en-US" sz="1200" b="1" dirty="0"/>
+              <a:t>week 21 (18 to 24 May) - </a:t>
+            </a:r>
+            <a:r>
+              <a:rPr lang="en-GB" sz="1200" b="1" dirty="0"/>
+              <a:t>136,779 </a:t>
+            </a:r>
+            <a:r>
+              <a:rPr lang="en-US" sz="1200" b="1" dirty="0"/>
+              <a:t>cases</a:t>
+            </a:r>
+            <a:endParaRPr lang="en-GB" sz="1200" dirty="0"/>
+          </a:p>
+        </p:txBody>
+      </p:sp>
+      <p:pic>
+        <p:nvPicPr>
+          <p:cNvPr id="15" name="Graphic 14" descr="Test tubes">
+            <a:extLst>
+              <a:ext uri="{FF2B5EF4-FFF2-40B4-BE49-F238E27FC236}">
+                <a16:creationId xmlns:a16="http://schemas.microsoft.com/office/drawing/2014/main" id="{3C3D55DF-8F4D-1E47-A93D-ACC46F60D6AC}"/>
+              </a:ext>
+            </a:extLst>
+          </p:cNvPr>
+          <p:cNvPicPr>
+            <a:picLocks noChangeAspect="1"/>
+          </p:cNvPicPr>
+          <p:nvPr/>
+        </p:nvPicPr>
+        <p:blipFill>
+          <a:blip r:embed="rId3">
+            <a:extLst>
+              <a:ext uri="{96DAC541-7B7A-43D3-8B79-37D633B846F1}">
+                <asvg:svgBlip xmlns:asvg="http://schemas.microsoft.com/office/drawing/2016/SVG/main" r:embed="rId4"/>
+              </a:ext>
+            </a:extLst>
+          </a:blip>
+          <a:stretch>
+            <a:fillRect/>
+          </a:stretch>
+        </p:blipFill>
+        <p:spPr>
+          <a:xfrm>
+            <a:off x="787113" y="4387315"/>
+            <a:ext cx="647700" cy="647700"/>
+          </a:xfrm>
+          <a:prstGeom prst="rect">
+            <a:avLst/>
+          </a:prstGeom>
+        </p:spPr>
+      </p:pic>
+      <p:sp>
+        <p:nvSpPr>
+          <p:cNvPr id="17" name="Rectangle 16">
+            <a:extLst>
+              <a:ext uri="{FF2B5EF4-FFF2-40B4-BE49-F238E27FC236}">
+                <a16:creationId xmlns:a16="http://schemas.microsoft.com/office/drawing/2014/main" id="{B86ED9A7-B0A1-3043-8935-F3383E158280}"/>
+              </a:ext>
+            </a:extLst>
+          </p:cNvPr>
+          <p:cNvSpPr/>
+          <p:nvPr/>
+        </p:nvSpPr>
+        <p:spPr>
+          <a:xfrm>
+            <a:off x="1434813" y="4341833"/>
+            <a:ext cx="2679700" cy="738664"/>
+          </a:xfrm>
+          <a:prstGeom prst="rect">
+            <a:avLst/>
+          </a:prstGeom>
+        </p:spPr>
+        <p:txBody>
+          <a:bodyPr wrap="square">
+            <a:spAutoFit/>
+          </a:bodyPr>
+          <a:lstStyle/>
+          <a:p>
+            <a:r>
+              <a:rPr lang="en-GB" sz="1400" dirty="0">
+                <a:solidFill>
+                  <a:srgbClr val="13171D"/>
+                </a:solidFill>
+                <a:latin typeface="Calibri" panose="020F0502020204030204" pitchFamily="34" charset="0"/>
+                <a:cs typeface="Calibri" panose="020F0502020204030204" pitchFamily="34" charset="0"/>
+              </a:rPr>
+              <a:t>Just over one in six confirmed cases (pillar 1) are from BAME ethnic groups (17.3%)</a:t>
+            </a:r>
+            <a:endParaRPr lang="en-US" sz="1400" dirty="0">
+              <a:latin typeface="Calibri" panose="020F0502020204030204" pitchFamily="34" charset="0"/>
+              <a:cs typeface="Calibri" panose="020F0502020204030204" pitchFamily="34" charset="0"/>
+            </a:endParaRPr>
+          </a:p>
+        </p:txBody>
+      </p:sp>
+      <p:sp>
+        <p:nvSpPr>
+          <p:cNvPr id="16" name="Rectangle 15">
+            <a:extLst>
+              <a:ext uri="{FF2B5EF4-FFF2-40B4-BE49-F238E27FC236}">
+                <a16:creationId xmlns:a16="http://schemas.microsoft.com/office/drawing/2014/main" id="{E1DA8AFC-F682-814F-8CE1-8BCE82AF565D}"/>
+              </a:ext>
+            </a:extLst>
+          </p:cNvPr>
+          <p:cNvSpPr/>
+          <p:nvPr/>
+        </p:nvSpPr>
+        <p:spPr>
+          <a:xfrm>
+            <a:off x="308122" y="950881"/>
+            <a:ext cx="4264273" cy="954107"/>
+          </a:xfrm>
+          <a:prstGeom prst="rect">
+            <a:avLst/>
+          </a:prstGeom>
+        </p:spPr>
+        <p:txBody>
+          <a:bodyPr wrap="square">
+            <a:spAutoFit/>
+          </a:bodyPr>
+          <a:lstStyle/>
+          <a:p>
+            <a:pPr algn="just"/>
+            <a:r>
+              <a:rPr lang="en-GB" sz="1400" dirty="0">
+                <a:solidFill>
+                  <a:srgbClr val="FF0000"/>
+                </a:solidFill>
+                <a:latin typeface="Calibri" panose="020F0502020204030204" pitchFamily="34" charset="0"/>
+                <a:cs typeface="Calibri" panose="020F0502020204030204" pitchFamily="34" charset="0"/>
+              </a:rPr>
+              <a:t>Diagnoses rate differences may reflect differences in likelihood of presenting to hospital with a medical need as well as in the likelihood of being tested for Covid-19 and not just in the risk of getting the infection itself.</a:t>
+            </a:r>
+          </a:p>
+        </p:txBody>
+      </p:sp>
+      <p:sp>
+        <p:nvSpPr>
+          <p:cNvPr id="19" name="Rectangle 18">
+            <a:extLst>
+              <a:ext uri="{FF2B5EF4-FFF2-40B4-BE49-F238E27FC236}">
+                <a16:creationId xmlns:a16="http://schemas.microsoft.com/office/drawing/2014/main" id="{DCFB0591-E43F-E94C-8F1D-19E9B0FE2950}"/>
+              </a:ext>
+            </a:extLst>
+          </p:cNvPr>
+          <p:cNvSpPr/>
+          <p:nvPr/>
+        </p:nvSpPr>
+        <p:spPr>
+          <a:xfrm>
+            <a:off x="7608" y="652064"/>
+            <a:ext cx="2679700" cy="307777"/>
+          </a:xfrm>
+          <a:prstGeom prst="rect">
+            <a:avLst/>
+          </a:prstGeom>
+        </p:spPr>
+        <p:txBody>
+          <a:bodyPr wrap="square">
+            <a:spAutoFit/>
+          </a:bodyPr>
+          <a:lstStyle/>
+          <a:p>
+            <a:r>
+              <a:rPr lang="en-GB" sz="1400" b="1" dirty="0">
+                <a:solidFill>
+                  <a:srgbClr val="13171D"/>
+                </a:solidFill>
+                <a:latin typeface="Calibri" panose="020F0502020204030204" pitchFamily="34" charset="0"/>
+                <a:cs typeface="Calibri" panose="020F0502020204030204" pitchFamily="34" charset="0"/>
+              </a:rPr>
+              <a:t>Important to remember…</a:t>
+            </a:r>
+            <a:endParaRPr lang="en-US" sz="1400" b="1" dirty="0">
+              <a:latin typeface="Calibri" panose="020F0502020204030204" pitchFamily="34" charset="0"/>
+              <a:cs typeface="Calibri" panose="020F0502020204030204" pitchFamily="34" charset="0"/>
+            </a:endParaRPr>
+          </a:p>
+        </p:txBody>
+      </p:sp>
+      <p:sp>
+        <p:nvSpPr>
+          <p:cNvPr id="20" name="TextBox 19">
+            <a:extLst>
+              <a:ext uri="{FF2B5EF4-FFF2-40B4-BE49-F238E27FC236}">
+                <a16:creationId xmlns:a16="http://schemas.microsoft.com/office/drawing/2014/main" id="{5C894591-EFB3-5C44-91C6-5F356118E4CA}"/>
+              </a:ext>
+            </a:extLst>
+          </p:cNvPr>
+          <p:cNvSpPr txBox="1"/>
+          <p:nvPr/>
+        </p:nvSpPr>
+        <p:spPr>
+          <a:xfrm>
+            <a:off x="7608" y="172137"/>
+            <a:ext cx="12628892" cy="307777"/>
+          </a:xfrm>
+          <a:prstGeom prst="rect">
+            <a:avLst/>
+          </a:prstGeom>
+          <a:noFill/>
+        </p:spPr>
+        <p:txBody>
+          <a:bodyPr wrap="square" rtlCol="0">
+            <a:spAutoFit/>
+          </a:bodyPr>
+          <a:lstStyle/>
+          <a:p>
+            <a:r>
+              <a:rPr lang="en-US" sz="1400" b="1" dirty="0">
+                <a:solidFill>
+                  <a:schemeClr val="bg1"/>
+                </a:solidFill>
+                <a:latin typeface="Verdana" panose="020B0604030504040204" pitchFamily="34" charset="0"/>
+                <a:ea typeface="Verdana" panose="020B0604030504040204" pitchFamily="34" charset="0"/>
+                <a:cs typeface="Verdana" panose="020B0604030504040204" pitchFamily="34" charset="0"/>
+              </a:rPr>
+              <a:t>Confirmed Covid-19 cases </a:t>
+            </a:r>
+          </a:p>
+        </p:txBody>
+      </p:sp>
+      <p:sp>
+        <p:nvSpPr>
+          <p:cNvPr id="11" name="Rectangle 10">
+            <a:extLst>
+              <a:ext uri="{FF2B5EF4-FFF2-40B4-BE49-F238E27FC236}">
+                <a16:creationId xmlns:a16="http://schemas.microsoft.com/office/drawing/2014/main" id="{E35F297E-F54E-AD4B-B008-FF43F5EC2A68}"/>
+              </a:ext>
+            </a:extLst>
+          </p:cNvPr>
+          <p:cNvSpPr/>
+          <p:nvPr/>
+        </p:nvSpPr>
+        <p:spPr>
+          <a:xfrm>
+            <a:off x="7213934" y="1090063"/>
+            <a:ext cx="3323213" cy="307777"/>
+          </a:xfrm>
+          <a:prstGeom prst="rect">
+            <a:avLst/>
+          </a:prstGeom>
+        </p:spPr>
+        <p:txBody>
+          <a:bodyPr wrap="square">
+            <a:spAutoFit/>
+          </a:bodyPr>
+          <a:lstStyle/>
+          <a:p>
+            <a:r>
+              <a:rPr lang="en-GB" sz="1400" dirty="0">
+                <a:solidFill>
+                  <a:srgbClr val="13171D"/>
+                </a:solidFill>
+                <a:latin typeface="Calibri" panose="020F0502020204030204" pitchFamily="34" charset="0"/>
+                <a:cs typeface="Calibri" panose="020F0502020204030204" pitchFamily="34" charset="0"/>
+              </a:rPr>
+              <a:t>Ethnicity is known for about 92% of cases.</a:t>
+            </a:r>
+            <a:endParaRPr lang="en-US" sz="1400" dirty="0">
+              <a:latin typeface="Calibri" panose="020F0502020204030204" pitchFamily="34" charset="0"/>
+              <a:cs typeface="Calibri" panose="020F0502020204030204" pitchFamily="34" charset="0"/>
+            </a:endParaRPr>
+          </a:p>
+        </p:txBody>
+      </p:sp>
+      <p:sp>
+        <p:nvSpPr>
+          <p:cNvPr id="2" name="Rectangle 1">
+            <a:extLst>
+              <a:ext uri="{FF2B5EF4-FFF2-40B4-BE49-F238E27FC236}">
+                <a16:creationId xmlns:a16="http://schemas.microsoft.com/office/drawing/2014/main" id="{5BD3F16F-4101-A049-9AED-3CFCCDB0745F}"/>
+              </a:ext>
+            </a:extLst>
+          </p:cNvPr>
+          <p:cNvSpPr/>
+          <p:nvPr/>
+        </p:nvSpPr>
+        <p:spPr>
+          <a:xfrm>
+            <a:off x="5477934" y="677153"/>
+            <a:ext cx="5732340" cy="276999"/>
+          </a:xfrm>
+          <a:prstGeom prst="rect">
+            <a:avLst/>
+          </a:prstGeom>
+        </p:spPr>
+        <p:txBody>
+          <a:bodyPr wrap="square">
+            <a:spAutoFit/>
+          </a:bodyPr>
+          <a:lstStyle/>
+          <a:p>
+            <a:r>
+              <a:rPr lang="en-GB" sz="1200" b="1" dirty="0"/>
+              <a:t>Disparities in the risk and outcomes from COVID-19; Public Health England 2/6/2020</a:t>
+            </a:r>
+          </a:p>
+        </p:txBody>
+      </p:sp>
+      <p:sp>
+        <p:nvSpPr>
+          <p:cNvPr id="3" name="Rectangle 2">
+            <a:extLst>
+              <a:ext uri="{FF2B5EF4-FFF2-40B4-BE49-F238E27FC236}">
+                <a16:creationId xmlns:a16="http://schemas.microsoft.com/office/drawing/2014/main" id="{860491B1-EAE7-5E4E-8B05-56D9790E75DF}"/>
+              </a:ext>
+            </a:extLst>
+          </p:cNvPr>
+          <p:cNvSpPr/>
+          <p:nvPr/>
+        </p:nvSpPr>
+        <p:spPr>
+          <a:xfrm>
+            <a:off x="10236616" y="5626734"/>
+            <a:ext cx="1058333" cy="646331"/>
+          </a:xfrm>
+          <a:prstGeom prst="rect">
+            <a:avLst/>
+          </a:prstGeom>
+        </p:spPr>
+        <p:txBody>
+          <a:bodyPr wrap="square">
+            <a:spAutoFit/>
+          </a:bodyPr>
+          <a:lstStyle/>
+          <a:p>
+            <a:r>
+              <a:rPr lang="en-GB" dirty="0">
+                <a:latin typeface="Calibri" panose="020F0502020204030204" pitchFamily="34" charset="0"/>
+                <a:cs typeface="Calibri" panose="020F0502020204030204" pitchFamily="34" charset="0"/>
+              </a:rPr>
+              <a:t>486 per 100,000</a:t>
+            </a:r>
+          </a:p>
+        </p:txBody>
+      </p:sp>
+      <p:sp>
+        <p:nvSpPr>
+          <p:cNvPr id="14" name="Rectangle 13">
+            <a:extLst>
+              <a:ext uri="{FF2B5EF4-FFF2-40B4-BE49-F238E27FC236}">
+                <a16:creationId xmlns:a16="http://schemas.microsoft.com/office/drawing/2014/main" id="{D3D4A4BE-E391-EE48-AAFA-A8F075E4B70D}"/>
+              </a:ext>
+            </a:extLst>
+          </p:cNvPr>
+          <p:cNvSpPr/>
+          <p:nvPr/>
+        </p:nvSpPr>
+        <p:spPr>
+          <a:xfrm>
+            <a:off x="8314882" y="5609911"/>
+            <a:ext cx="1058333" cy="646331"/>
+          </a:xfrm>
+          <a:prstGeom prst="rect">
+            <a:avLst/>
+          </a:prstGeom>
+        </p:spPr>
+        <p:txBody>
+          <a:bodyPr wrap="square">
+            <a:spAutoFit/>
+          </a:bodyPr>
+          <a:lstStyle/>
+          <a:p>
+            <a:r>
+              <a:rPr lang="en-GB" dirty="0">
+                <a:latin typeface="Calibri" panose="020F0502020204030204" pitchFamily="34" charset="0"/>
+                <a:cs typeface="Calibri" panose="020F0502020204030204" pitchFamily="34" charset="0"/>
+              </a:rPr>
+              <a:t>649 per 100,000</a:t>
+            </a:r>
+          </a:p>
+        </p:txBody>
+      </p:sp>
+      <p:sp>
+        <p:nvSpPr>
+          <p:cNvPr id="18" name="Rectangle 17">
+            <a:extLst>
+              <a:ext uri="{FF2B5EF4-FFF2-40B4-BE49-F238E27FC236}">
+                <a16:creationId xmlns:a16="http://schemas.microsoft.com/office/drawing/2014/main" id="{217BFF9B-23EF-5B45-93A8-6D736F202852}"/>
+              </a:ext>
+            </a:extLst>
+          </p:cNvPr>
+          <p:cNvSpPr/>
+          <p:nvPr/>
+        </p:nvSpPr>
+        <p:spPr>
+          <a:xfrm>
+            <a:off x="10236616" y="4837359"/>
+            <a:ext cx="1058333" cy="646331"/>
+          </a:xfrm>
+          <a:prstGeom prst="rect">
+            <a:avLst/>
+          </a:prstGeom>
+        </p:spPr>
+        <p:txBody>
+          <a:bodyPr wrap="square">
+            <a:spAutoFit/>
+          </a:bodyPr>
+          <a:lstStyle/>
+          <a:p>
+            <a:r>
+              <a:rPr lang="en-GB" dirty="0">
+                <a:latin typeface="Calibri" panose="020F0502020204030204" pitchFamily="34" charset="0"/>
+                <a:cs typeface="Calibri" panose="020F0502020204030204" pitchFamily="34" charset="0"/>
+              </a:rPr>
+              <a:t>220 per 100,000</a:t>
+            </a:r>
+          </a:p>
+        </p:txBody>
+      </p:sp>
+      <p:sp>
+        <p:nvSpPr>
+          <p:cNvPr id="21" name="Rectangle 20">
+            <a:extLst>
+              <a:ext uri="{FF2B5EF4-FFF2-40B4-BE49-F238E27FC236}">
+                <a16:creationId xmlns:a16="http://schemas.microsoft.com/office/drawing/2014/main" id="{68DFA11C-A4B1-074A-91CE-7AF4E8CEE7AD}"/>
+              </a:ext>
+            </a:extLst>
+          </p:cNvPr>
+          <p:cNvSpPr/>
+          <p:nvPr/>
+        </p:nvSpPr>
+        <p:spPr>
+          <a:xfrm>
+            <a:off x="8314882" y="4820536"/>
+            <a:ext cx="1058333" cy="646331"/>
+          </a:xfrm>
+          <a:prstGeom prst="rect">
+            <a:avLst/>
+          </a:prstGeom>
+        </p:spPr>
+        <p:txBody>
+          <a:bodyPr wrap="square">
+            <a:spAutoFit/>
+          </a:bodyPr>
+          <a:lstStyle/>
+          <a:p>
+            <a:r>
+              <a:rPr lang="en-GB" dirty="0">
+                <a:latin typeface="Calibri" panose="020F0502020204030204" pitchFamily="34" charset="0"/>
+                <a:cs typeface="Calibri" panose="020F0502020204030204" pitchFamily="34" charset="0"/>
+              </a:rPr>
+              <a:t>224 per 100,000</a:t>
+            </a:r>
+          </a:p>
+        </p:txBody>
+      </p:sp>
+      <p:pic>
+        <p:nvPicPr>
+          <p:cNvPr id="7" name="Graphic 6" descr="Man and woman">
+            <a:extLst>
+              <a:ext uri="{FF2B5EF4-FFF2-40B4-BE49-F238E27FC236}">
+                <a16:creationId xmlns:a16="http://schemas.microsoft.com/office/drawing/2014/main" id="{202AB71F-3AE9-214D-BC7A-BA3893031F0C}"/>
+              </a:ext>
+            </a:extLst>
+          </p:cNvPr>
+          <p:cNvPicPr>
+            <a:picLocks noChangeAspect="1"/>
+          </p:cNvPicPr>
+          <p:nvPr/>
+        </p:nvPicPr>
+        <p:blipFill>
+          <a:blip r:embed="rId5">
+            <a:extLst>
+              <a:ext uri="{96DAC541-7B7A-43D3-8B79-37D633B846F1}">
+                <asvg:svgBlip xmlns:asvg="http://schemas.microsoft.com/office/drawing/2016/SVG/main" r:embed="rId6"/>
+              </a:ext>
+            </a:extLst>
+          </a:blip>
+          <a:stretch>
+            <a:fillRect/>
+          </a:stretch>
+        </p:blipFill>
+        <p:spPr>
+          <a:xfrm>
+            <a:off x="9257120" y="4623297"/>
+            <a:ext cx="914400" cy="914400"/>
+          </a:xfrm>
+          <a:prstGeom prst="rect">
+            <a:avLst/>
+          </a:prstGeom>
+        </p:spPr>
+      </p:pic>
+      <p:sp>
+        <p:nvSpPr>
+          <p:cNvPr id="10" name="Rectangle 9">
+            <a:extLst>
+              <a:ext uri="{FF2B5EF4-FFF2-40B4-BE49-F238E27FC236}">
+                <a16:creationId xmlns:a16="http://schemas.microsoft.com/office/drawing/2014/main" id="{0570ACF8-4378-854F-BF22-AA684DF20C17}"/>
+              </a:ext>
+            </a:extLst>
+          </p:cNvPr>
+          <p:cNvSpPr/>
+          <p:nvPr/>
+        </p:nvSpPr>
+        <p:spPr>
+          <a:xfrm>
+            <a:off x="7560445" y="4951105"/>
+            <a:ext cx="766941" cy="369332"/>
+          </a:xfrm>
+          <a:prstGeom prst="rect">
+            <a:avLst/>
+          </a:prstGeom>
+        </p:spPr>
+        <p:txBody>
+          <a:bodyPr wrap="none">
+            <a:spAutoFit/>
+          </a:bodyPr>
+          <a:lstStyle/>
+          <a:p>
+            <a:r>
+              <a:rPr lang="en-GB" b="1" dirty="0"/>
+              <a:t>White</a:t>
+            </a:r>
+          </a:p>
+        </p:txBody>
+      </p:sp>
+      <p:sp>
+        <p:nvSpPr>
+          <p:cNvPr id="22" name="Rectangle 21">
+            <a:extLst>
+              <a:ext uri="{FF2B5EF4-FFF2-40B4-BE49-F238E27FC236}">
+                <a16:creationId xmlns:a16="http://schemas.microsoft.com/office/drawing/2014/main" id="{3536DDB9-C276-2341-9EAB-225CEE1FCB4D}"/>
+              </a:ext>
+            </a:extLst>
+          </p:cNvPr>
+          <p:cNvSpPr/>
+          <p:nvPr/>
+        </p:nvSpPr>
+        <p:spPr>
+          <a:xfrm>
+            <a:off x="7560445" y="5724517"/>
+            <a:ext cx="691215" cy="369332"/>
+          </a:xfrm>
+          <a:prstGeom prst="rect">
+            <a:avLst/>
+          </a:prstGeom>
+        </p:spPr>
+        <p:txBody>
+          <a:bodyPr wrap="none">
+            <a:spAutoFit/>
+          </a:bodyPr>
+          <a:lstStyle/>
+          <a:p>
+            <a:r>
+              <a:rPr lang="en-GB" b="1" dirty="0"/>
+              <a:t>Black</a:t>
+            </a:r>
+          </a:p>
+        </p:txBody>
+      </p:sp>
+      <p:sp>
+        <p:nvSpPr>
+          <p:cNvPr id="23" name="Rectangle 22">
+            <a:extLst>
+              <a:ext uri="{FF2B5EF4-FFF2-40B4-BE49-F238E27FC236}">
+                <a16:creationId xmlns:a16="http://schemas.microsoft.com/office/drawing/2014/main" id="{F323E39E-394A-4E41-97F6-9F83CF46B836}"/>
+              </a:ext>
+            </a:extLst>
+          </p:cNvPr>
+          <p:cNvSpPr/>
+          <p:nvPr/>
+        </p:nvSpPr>
+        <p:spPr>
+          <a:xfrm>
+            <a:off x="8390608" y="4468027"/>
+            <a:ext cx="763351" cy="369332"/>
+          </a:xfrm>
+          <a:prstGeom prst="rect">
+            <a:avLst/>
+          </a:prstGeom>
+        </p:spPr>
+        <p:txBody>
+          <a:bodyPr wrap="none">
+            <a:spAutoFit/>
+          </a:bodyPr>
+          <a:lstStyle/>
+          <a:p>
+            <a:r>
+              <a:rPr lang="en-GB" b="1" dirty="0"/>
+              <a:t>Males</a:t>
+            </a:r>
+          </a:p>
+        </p:txBody>
+      </p:sp>
+      <p:sp>
+        <p:nvSpPr>
+          <p:cNvPr id="24" name="Rectangle 23">
+            <a:extLst>
+              <a:ext uri="{FF2B5EF4-FFF2-40B4-BE49-F238E27FC236}">
+                <a16:creationId xmlns:a16="http://schemas.microsoft.com/office/drawing/2014/main" id="{24F92F1C-58DA-2344-BF9A-8E501A186ABE}"/>
+              </a:ext>
+            </a:extLst>
+          </p:cNvPr>
+          <p:cNvSpPr/>
+          <p:nvPr/>
+        </p:nvSpPr>
+        <p:spPr>
+          <a:xfrm>
+            <a:off x="10274681" y="4451204"/>
+            <a:ext cx="966740" cy="369332"/>
+          </a:xfrm>
+          <a:prstGeom prst="rect">
+            <a:avLst/>
+          </a:prstGeom>
+        </p:spPr>
+        <p:txBody>
+          <a:bodyPr wrap="none">
+            <a:spAutoFit/>
+          </a:bodyPr>
+          <a:lstStyle/>
+          <a:p>
+            <a:r>
+              <a:rPr lang="en-GB" b="1" dirty="0"/>
+              <a:t>Females</a:t>
+            </a:r>
+          </a:p>
+        </p:txBody>
+      </p:sp>
+      <p:pic>
+        <p:nvPicPr>
+          <p:cNvPr id="13" name="Picture 12">
+            <a:extLst>
+              <a:ext uri="{FF2B5EF4-FFF2-40B4-BE49-F238E27FC236}">
+                <a16:creationId xmlns:a16="http://schemas.microsoft.com/office/drawing/2014/main" id="{9F521EFB-2755-1A41-A753-4867A00C34C0}"/>
+              </a:ext>
+            </a:extLst>
+          </p:cNvPr>
+          <p:cNvPicPr>
+            <a:picLocks noChangeAspect="1"/>
+          </p:cNvPicPr>
+          <p:nvPr/>
+        </p:nvPicPr>
+        <p:blipFill>
+          <a:blip r:embed="rId7"/>
+          <a:stretch>
+            <a:fillRect/>
+          </a:stretch>
+        </p:blipFill>
+        <p:spPr>
+          <a:xfrm>
+            <a:off x="9436437" y="5555439"/>
+            <a:ext cx="567267" cy="567267"/>
+          </a:xfrm>
+          <a:prstGeom prst="rect">
+            <a:avLst/>
+          </a:prstGeom>
+        </p:spPr>
+      </p:pic>
+      <p:sp>
+        <p:nvSpPr>
+          <p:cNvPr id="27" name="Rectangle 26">
+            <a:extLst>
+              <a:ext uri="{FF2B5EF4-FFF2-40B4-BE49-F238E27FC236}">
+                <a16:creationId xmlns:a16="http://schemas.microsoft.com/office/drawing/2014/main" id="{901E5768-85D0-234C-A4E3-04000962D1AE}"/>
+              </a:ext>
+            </a:extLst>
+          </p:cNvPr>
+          <p:cNvSpPr/>
+          <p:nvPr/>
+        </p:nvSpPr>
+        <p:spPr>
+          <a:xfrm>
+            <a:off x="5292649" y="4706446"/>
+            <a:ext cx="2127409" cy="1477328"/>
+          </a:xfrm>
+          <a:prstGeom prst="rect">
+            <a:avLst/>
+          </a:prstGeom>
+        </p:spPr>
+        <p:txBody>
+          <a:bodyPr wrap="square">
+            <a:spAutoFit/>
+          </a:bodyPr>
+          <a:lstStyle/>
+          <a:p>
+            <a:r>
+              <a:rPr lang="en-GB" sz="1000" dirty="0">
+                <a:solidFill>
+                  <a:srgbClr val="13171D"/>
+                </a:solidFill>
+                <a:latin typeface="Calibri" panose="020F0502020204030204" pitchFamily="34" charset="0"/>
+                <a:cs typeface="Calibri" panose="020F0502020204030204" pitchFamily="34" charset="0"/>
+              </a:rPr>
+              <a:t>Age standardised rates of confirmed diagnoses per 100,000 population are double among Black  females compared to White females.</a:t>
+            </a:r>
+          </a:p>
+          <a:p>
+            <a:endParaRPr lang="en-GB" sz="1000" dirty="0">
+              <a:solidFill>
+                <a:srgbClr val="13171D"/>
+              </a:solidFill>
+              <a:latin typeface="Calibri" panose="020F0502020204030204" pitchFamily="34" charset="0"/>
+              <a:cs typeface="Calibri" panose="020F0502020204030204" pitchFamily="34" charset="0"/>
+            </a:endParaRPr>
+          </a:p>
+          <a:p>
+            <a:r>
+              <a:rPr lang="en-GB" sz="1000" dirty="0">
+                <a:solidFill>
+                  <a:srgbClr val="13171D"/>
+                </a:solidFill>
+                <a:latin typeface="Calibri" panose="020F0502020204030204" pitchFamily="34" charset="0"/>
+                <a:cs typeface="Calibri" panose="020F0502020204030204" pitchFamily="34" charset="0"/>
+              </a:rPr>
+              <a:t>Among males, the diagnosis rate is almost three times higher among Black ethnic groups compared to White groups.</a:t>
+            </a:r>
+            <a:endParaRPr lang="en-US" sz="1000" dirty="0">
+              <a:latin typeface="Calibri" panose="020F0502020204030204" pitchFamily="34" charset="0"/>
+              <a:cs typeface="Calibri" panose="020F0502020204030204" pitchFamily="34" charset="0"/>
+            </a:endParaRPr>
+          </a:p>
+        </p:txBody>
+      </p:sp>
+      <p:pic>
+        <p:nvPicPr>
+          <p:cNvPr id="30" name="Picture 29">
+            <a:extLst>
+              <a:ext uri="{FF2B5EF4-FFF2-40B4-BE49-F238E27FC236}">
+                <a16:creationId xmlns:a16="http://schemas.microsoft.com/office/drawing/2014/main" id="{B580D283-2C32-A34B-B8EB-E6FCE54D54DD}"/>
+              </a:ext>
+            </a:extLst>
+          </p:cNvPr>
+          <p:cNvPicPr>
+            <a:picLocks noChangeAspect="1"/>
+          </p:cNvPicPr>
+          <p:nvPr/>
+        </p:nvPicPr>
+        <p:blipFill>
+          <a:blip r:embed="rId8"/>
+          <a:stretch>
+            <a:fillRect/>
+          </a:stretch>
+        </p:blipFill>
+        <p:spPr>
+          <a:xfrm>
+            <a:off x="7002756" y="1802797"/>
+            <a:ext cx="4554660" cy="2189666"/>
+          </a:xfrm>
+          <a:prstGeom prst="rect">
+            <a:avLst/>
+          </a:prstGeom>
+        </p:spPr>
+      </p:pic>
+      <p:sp>
+        <p:nvSpPr>
+          <p:cNvPr id="31" name="Rectangle 30">
+            <a:extLst>
+              <a:ext uri="{FF2B5EF4-FFF2-40B4-BE49-F238E27FC236}">
+                <a16:creationId xmlns:a16="http://schemas.microsoft.com/office/drawing/2014/main" id="{6B28960F-A685-E345-80F4-A3E2A17F8634}"/>
+              </a:ext>
+            </a:extLst>
+          </p:cNvPr>
+          <p:cNvSpPr/>
+          <p:nvPr/>
+        </p:nvSpPr>
+        <p:spPr>
+          <a:xfrm>
+            <a:off x="6996931" y="1595079"/>
+            <a:ext cx="5045311" cy="261610"/>
+          </a:xfrm>
+          <a:prstGeom prst="rect">
+            <a:avLst/>
+          </a:prstGeom>
+        </p:spPr>
+        <p:txBody>
+          <a:bodyPr wrap="square">
+            <a:spAutoFit/>
+          </a:bodyPr>
+          <a:lstStyle/>
+          <a:p>
+            <a:r>
+              <a:rPr lang="en-GB" sz="1100" b="1" dirty="0">
+                <a:latin typeface="Calibri" panose="020F0502020204030204" pitchFamily="34" charset="0"/>
+                <a:cs typeface="Calibri" panose="020F0502020204030204" pitchFamily="34" charset="0"/>
+              </a:rPr>
+              <a:t>Age standardised diagnosis rates by ethnicity and sex, as of 13 May 2020, England. </a:t>
+            </a:r>
+          </a:p>
+        </p:txBody>
+      </p:sp>
+      <p:sp>
+        <p:nvSpPr>
+          <p:cNvPr id="32" name="Rectangle 31">
+            <a:extLst>
+              <a:ext uri="{FF2B5EF4-FFF2-40B4-BE49-F238E27FC236}">
+                <a16:creationId xmlns:a16="http://schemas.microsoft.com/office/drawing/2014/main" id="{4B434B04-BE48-824D-A7D7-43AF4F061B36}"/>
+              </a:ext>
+            </a:extLst>
+          </p:cNvPr>
+          <p:cNvSpPr/>
+          <p:nvPr/>
+        </p:nvSpPr>
+        <p:spPr>
+          <a:xfrm>
+            <a:off x="8271933" y="3944466"/>
+            <a:ext cx="6096000" cy="230832"/>
+          </a:xfrm>
+          <a:prstGeom prst="rect">
+            <a:avLst/>
+          </a:prstGeom>
+        </p:spPr>
+        <p:txBody>
+          <a:bodyPr>
+            <a:spAutoFit/>
+          </a:bodyPr>
+          <a:lstStyle/>
+          <a:p>
+            <a:r>
+              <a:rPr lang="en-GB" sz="900" dirty="0">
+                <a:latin typeface="Calibri" panose="020F0502020204030204" pitchFamily="34" charset="0"/>
+                <a:cs typeface="Calibri" panose="020F0502020204030204" pitchFamily="34" charset="0"/>
+              </a:rPr>
+              <a:t>Source: Public Health England Second Generation Surveillance System.</a:t>
+            </a:r>
+            <a:endParaRPr lang="en-US" sz="900" dirty="0"/>
+          </a:p>
+        </p:txBody>
+      </p:sp>
+      <p:sp>
+        <p:nvSpPr>
+          <p:cNvPr id="33" name="Rectangle 32">
+            <a:extLst>
+              <a:ext uri="{FF2B5EF4-FFF2-40B4-BE49-F238E27FC236}">
+                <a16:creationId xmlns:a16="http://schemas.microsoft.com/office/drawing/2014/main" id="{85BCEA57-4F87-C648-8255-14B8BECB5DB2}"/>
+              </a:ext>
+            </a:extLst>
+          </p:cNvPr>
+          <p:cNvSpPr/>
+          <p:nvPr/>
+        </p:nvSpPr>
+        <p:spPr>
+          <a:xfrm>
+            <a:off x="5418397" y="1564235"/>
+            <a:ext cx="1575622" cy="1015663"/>
+          </a:xfrm>
+          <a:prstGeom prst="rect">
+            <a:avLst/>
+          </a:prstGeom>
+        </p:spPr>
+        <p:txBody>
+          <a:bodyPr wrap="square">
+            <a:spAutoFit/>
+          </a:bodyPr>
+          <a:lstStyle/>
+          <a:p>
+            <a:pPr algn="just"/>
+            <a:r>
+              <a:rPr lang="en-GB" sz="1000" dirty="0">
+                <a:latin typeface="Calibri" panose="020F0502020204030204" pitchFamily="34" charset="0"/>
+                <a:cs typeface="Calibri" panose="020F0502020204030204" pitchFamily="34" charset="0"/>
+              </a:rPr>
+              <a:t>The highest diagnosis rates of Covid-19 per 100,000 population were among people of Other ethnic groups (1,076 for females and 1,101 for males).</a:t>
+            </a:r>
+          </a:p>
+        </p:txBody>
+      </p:sp>
+      <p:sp>
+        <p:nvSpPr>
+          <p:cNvPr id="34" name="Rectangle 33">
+            <a:extLst>
+              <a:ext uri="{FF2B5EF4-FFF2-40B4-BE49-F238E27FC236}">
+                <a16:creationId xmlns:a16="http://schemas.microsoft.com/office/drawing/2014/main" id="{ECC71EEA-BFD3-D649-B5EB-B253426E1BDA}"/>
+              </a:ext>
+            </a:extLst>
+          </p:cNvPr>
+          <p:cNvSpPr/>
+          <p:nvPr/>
+        </p:nvSpPr>
+        <p:spPr>
+          <a:xfrm>
+            <a:off x="9516104" y="6627168"/>
+            <a:ext cx="6088392" cy="230832"/>
+          </a:xfrm>
+          <a:prstGeom prst="rect">
+            <a:avLst/>
+          </a:prstGeom>
+        </p:spPr>
+        <p:txBody>
+          <a:bodyPr wrap="square">
+            <a:spAutoFit/>
+          </a:bodyPr>
+          <a:lstStyle/>
+          <a:p>
+            <a:r>
+              <a:rPr lang="en-GB" sz="900" dirty="0"/>
+              <a:t>Infographic images designed by </a:t>
+            </a:r>
+            <a:r>
+              <a:rPr lang="en-GB" sz="900" dirty="0" err="1"/>
+              <a:t>Freepik</a:t>
+            </a:r>
+            <a:r>
+              <a:rPr lang="en-GB" sz="900" dirty="0"/>
+              <a:t> from </a:t>
+            </a:r>
+            <a:r>
+              <a:rPr lang="en-GB" sz="900" dirty="0" err="1"/>
+              <a:t>Flaticon</a:t>
+            </a:r>
+            <a:endParaRPr lang="en-GB" sz="900" dirty="0">
+              <a:effectLst/>
+              <a:latin typeface="Calibri" panose="020F0502020204030204" pitchFamily="34" charset="0"/>
+              <a:cs typeface="Calibri" panose="020F0502020204030204" pitchFamily="34" charset="0"/>
+            </a:endParaRPr>
+          </a:p>
+        </p:txBody>
+      </p:sp>
+    </p:spTree>
+    <p:extLst>
+      <p:ext uri="{BB962C8B-B14F-4D97-AF65-F5344CB8AC3E}">
+        <p14:creationId xmlns:p14="http://schemas.microsoft.com/office/powerpoint/2010/main" val="1566203749"/>
+      </p:ext>
+    </p:extLst>
+  </p:cSld>
+  <p:clrMapOvr>
+    <a:masterClrMapping/>
+  </p:clrMapOvr>
+</p:sld>
+</file>
+
+<file path=ppt/slides/slide3.xml><?xml version="1.0" encoding="utf-8"?>
+<p:sld xmlns:a="http://schemas.openxmlformats.org/drawingml/2006/main" xmlns:r="http://schemas.openxmlformats.org/officeDocument/2006/relationships" xmlns:p="http://schemas.openxmlformats.org/presentationml/2006/main">
+  <p:cSld>
+    <p:spTree>
+      <p:nvGrpSpPr>
+        <p:cNvPr id="1" name=""/>
+        <p:cNvGrpSpPr/>
+        <p:nvPr/>
+      </p:nvGrpSpPr>
+      <p:grpSpPr>
+        <a:xfrm>
+          <a:off x="0" y="0"/>
+          <a:ext cx="0" cy="0"/>
+          <a:chOff x="0" y="0"/>
+          <a:chExt cx="0" cy="0"/>
+        </a:xfrm>
+      </p:grpSpPr>
+      <p:sp>
+        <p:nvSpPr>
+          <p:cNvPr id="5" name="Rectangle 4">
+            <a:extLst>
+              <a:ext uri="{FF2B5EF4-FFF2-40B4-BE49-F238E27FC236}">
+                <a16:creationId xmlns:a16="http://schemas.microsoft.com/office/drawing/2014/main" id="{B549D71B-9EEA-994A-8B53-D077FCDDE0B7}"/>
+              </a:ext>
+            </a:extLst>
+          </p:cNvPr>
+          <p:cNvSpPr/>
+          <p:nvPr/>
+        </p:nvSpPr>
+        <p:spPr>
+          <a:xfrm>
+            <a:off x="-7608" y="0"/>
+            <a:ext cx="12192000" cy="606582"/>
+          </a:xfrm>
+          <a:prstGeom prst="rect">
+            <a:avLst/>
+          </a:prstGeom>
+          <a:solidFill>
+            <a:srgbClr val="8E8E8E"/>
+          </a:solidFill>
+          <a:ln>
+            <a:solidFill>
+              <a:schemeClr val="tx2">
+                <a:lumMod val="20000"/>
+                <a:lumOff val="80000"/>
+              </a:schemeClr>
+            </a:solidFill>
+          </a:ln>
+        </p:spPr>
+        <p:style>
+          <a:lnRef idx="2">
+            <a:schemeClr val="accent1">
+              <a:shade val="50000"/>
+            </a:schemeClr>
+          </a:lnRef>
+          <a:fillRef idx="1">
+            <a:schemeClr val="accent1"/>
+          </a:fillRef>
+          <a:effectRef idx="0">
+            <a:schemeClr val="accent1"/>
+          </a:effectRef>
+          <a:fontRef idx="minor">
+            <a:schemeClr val="lt1"/>
+          </a:fontRef>
+        </p:style>
+        <p:txBody>
+          <a:bodyPr rtlCol="0" anchor="ctr"/>
+          <a:lstStyle/>
+          <a:p>
+            <a:pPr algn="ctr"/>
+            <a:endParaRPr lang="en-US" sz="800" dirty="0">
+              <a:latin typeface="Verdana" panose="020B0604030504040204" pitchFamily="34" charset="0"/>
+              <a:ea typeface="Verdana" panose="020B0604030504040204" pitchFamily="34" charset="0"/>
+              <a:cs typeface="Verdana" panose="020B0604030504040204" pitchFamily="34" charset="0"/>
+            </a:endParaRPr>
+          </a:p>
+        </p:txBody>
+      </p:sp>
+      <p:sp>
+        <p:nvSpPr>
+          <p:cNvPr id="10" name="Rectangle 9">
+            <a:extLst>
+              <a:ext uri="{FF2B5EF4-FFF2-40B4-BE49-F238E27FC236}">
+                <a16:creationId xmlns:a16="http://schemas.microsoft.com/office/drawing/2014/main" id="{14D7D192-29D6-9D4D-864D-A8CA5F51F989}"/>
+              </a:ext>
+            </a:extLst>
+          </p:cNvPr>
+          <p:cNvSpPr/>
+          <p:nvPr/>
+        </p:nvSpPr>
+        <p:spPr>
+          <a:xfrm>
+            <a:off x="177800" y="5773117"/>
+            <a:ext cx="5397500" cy="707886"/>
+          </a:xfrm>
+          <a:prstGeom prst="rect">
+            <a:avLst/>
+          </a:prstGeom>
+        </p:spPr>
+        <p:txBody>
+          <a:bodyPr wrap="square">
+            <a:spAutoFit/>
+          </a:bodyPr>
+          <a:lstStyle/>
+          <a:p>
+            <a:pPr algn="just"/>
+            <a:r>
+              <a:rPr lang="en-GB" sz="1000" dirty="0">
+                <a:latin typeface="Calibri" panose="020F0502020204030204" pitchFamily="34" charset="0"/>
+                <a:cs typeface="Calibri" panose="020F0502020204030204" pitchFamily="34" charset="0"/>
+              </a:rPr>
+              <a:t>Data on patients critically ill with confirmed COVID-19 reported to ICNARC up to 4pm on 28 May 2020 from critical care units participating in the Case Mix Programme (the national clinical audit covering all NHS adult, general intensive care and combined intensive care/high dependency units in England, Wales and Northern Ireland, plus some additional specialist and non-NHS critical care units). </a:t>
+            </a:r>
+          </a:p>
+        </p:txBody>
+      </p:sp>
+      <p:pic>
+        <p:nvPicPr>
+          <p:cNvPr id="12" name="Picture 11">
+            <a:extLst>
+              <a:ext uri="{FF2B5EF4-FFF2-40B4-BE49-F238E27FC236}">
+                <a16:creationId xmlns:a16="http://schemas.microsoft.com/office/drawing/2014/main" id="{274F1E7A-969E-1849-AF9A-4B5197398850}"/>
+              </a:ext>
+            </a:extLst>
+          </p:cNvPr>
+          <p:cNvPicPr>
+            <a:picLocks noChangeAspect="1"/>
+          </p:cNvPicPr>
+          <p:nvPr/>
+        </p:nvPicPr>
+        <p:blipFill>
+          <a:blip r:embed="rId3"/>
+          <a:srcRect/>
+          <a:stretch/>
+        </p:blipFill>
+        <p:spPr>
+          <a:xfrm>
+            <a:off x="410006" y="2256194"/>
+            <a:ext cx="4869585" cy="3516923"/>
+          </a:xfrm>
+          <a:prstGeom prst="rect">
+            <a:avLst/>
+          </a:prstGeom>
+        </p:spPr>
+      </p:pic>
+      <p:sp>
+        <p:nvSpPr>
+          <p:cNvPr id="13" name="Rectangle 12">
+            <a:extLst>
+              <a:ext uri="{FF2B5EF4-FFF2-40B4-BE49-F238E27FC236}">
+                <a16:creationId xmlns:a16="http://schemas.microsoft.com/office/drawing/2014/main" id="{92990DE4-A08C-1540-8121-4051D3D50DF5}"/>
+              </a:ext>
+            </a:extLst>
+          </p:cNvPr>
+          <p:cNvSpPr/>
+          <p:nvPr/>
+        </p:nvSpPr>
+        <p:spPr>
+          <a:xfrm>
+            <a:off x="177800" y="718302"/>
+            <a:ext cx="5397500" cy="646331"/>
+          </a:xfrm>
+          <a:prstGeom prst="rect">
+            <a:avLst/>
+          </a:prstGeom>
+        </p:spPr>
+        <p:txBody>
+          <a:bodyPr wrap="square">
+            <a:spAutoFit/>
+          </a:bodyPr>
+          <a:lstStyle/>
+          <a:p>
+            <a:pPr algn="just"/>
+            <a:r>
+              <a:rPr lang="en-GB" sz="1200" dirty="0">
+                <a:solidFill>
+                  <a:srgbClr val="13171D"/>
+                </a:solidFill>
+                <a:latin typeface="Calibri" panose="020F0502020204030204" pitchFamily="34" charset="0"/>
+                <a:cs typeface="Calibri" panose="020F0502020204030204" pitchFamily="34" charset="0"/>
+              </a:rPr>
+              <a:t>The audit compares the ethnicity of Covid-19 patients with the demographics of the local authority wards (based on 2011 census) in which those patients live (the best estimate of ethnicity by small area).</a:t>
+            </a:r>
+            <a:endParaRPr lang="en-US" sz="1200" dirty="0">
+              <a:latin typeface="Calibri" panose="020F0502020204030204" pitchFamily="34" charset="0"/>
+              <a:cs typeface="Calibri" panose="020F0502020204030204" pitchFamily="34" charset="0"/>
+            </a:endParaRPr>
+          </a:p>
+        </p:txBody>
+      </p:sp>
+      <p:sp>
+        <p:nvSpPr>
+          <p:cNvPr id="14" name="TextBox 13">
+            <a:extLst>
+              <a:ext uri="{FF2B5EF4-FFF2-40B4-BE49-F238E27FC236}">
+                <a16:creationId xmlns:a16="http://schemas.microsoft.com/office/drawing/2014/main" id="{8C09D4CE-F37E-0745-ACEE-C0F44EE03C0E}"/>
+              </a:ext>
+            </a:extLst>
+          </p:cNvPr>
+          <p:cNvSpPr txBox="1"/>
+          <p:nvPr/>
+        </p:nvSpPr>
+        <p:spPr>
+          <a:xfrm>
+            <a:off x="33012" y="147488"/>
+            <a:ext cx="12628892" cy="307777"/>
+          </a:xfrm>
+          <a:prstGeom prst="rect">
+            <a:avLst/>
+          </a:prstGeom>
+          <a:noFill/>
+        </p:spPr>
+        <p:txBody>
+          <a:bodyPr wrap="square" rtlCol="0">
+            <a:spAutoFit/>
+          </a:bodyPr>
+          <a:lstStyle/>
+          <a:p>
+            <a:r>
+              <a:rPr lang="en-US" sz="1400" b="1" dirty="0">
+                <a:solidFill>
+                  <a:schemeClr val="bg1"/>
+                </a:solidFill>
+                <a:latin typeface="Verdana" panose="020B0604030504040204" pitchFamily="34" charset="0"/>
+                <a:ea typeface="Verdana" panose="020B0604030504040204" pitchFamily="34" charset="0"/>
+                <a:cs typeface="Verdana" panose="020B0604030504040204" pitchFamily="34" charset="0"/>
+              </a:rPr>
+              <a:t>Hospital Admissions; Intensive Care National Audit Research Centre Report on Covid-19 admissions up to 28/05/2020</a:t>
+            </a:r>
+          </a:p>
+        </p:txBody>
+      </p:sp>
+      <p:sp>
+        <p:nvSpPr>
+          <p:cNvPr id="18" name="Rectangle 17">
+            <a:extLst>
+              <a:ext uri="{FF2B5EF4-FFF2-40B4-BE49-F238E27FC236}">
+                <a16:creationId xmlns:a16="http://schemas.microsoft.com/office/drawing/2014/main" id="{74FF12B0-BD8D-674A-9F31-5FB0BABACD9E}"/>
+              </a:ext>
+            </a:extLst>
+          </p:cNvPr>
+          <p:cNvSpPr/>
+          <p:nvPr/>
+        </p:nvSpPr>
+        <p:spPr>
+          <a:xfrm>
+            <a:off x="6096000" y="754070"/>
+            <a:ext cx="5397500" cy="307777"/>
+          </a:xfrm>
+          <a:prstGeom prst="rect">
+            <a:avLst/>
+          </a:prstGeom>
+        </p:spPr>
+        <p:txBody>
+          <a:bodyPr wrap="square">
+            <a:spAutoFit/>
+          </a:bodyPr>
+          <a:lstStyle/>
+          <a:p>
+            <a:pPr algn="just"/>
+            <a:r>
+              <a:rPr lang="en-GB" sz="1400" b="1" dirty="0">
+                <a:solidFill>
+                  <a:srgbClr val="13171D"/>
+                </a:solidFill>
+                <a:latin typeface="Calibri" panose="020F0502020204030204" pitchFamily="34" charset="0"/>
+                <a:cs typeface="Calibri" panose="020F0502020204030204" pitchFamily="34" charset="0"/>
+              </a:rPr>
+              <a:t>Compared to White ethnicity patients, non-White patients…</a:t>
+            </a:r>
+            <a:endParaRPr lang="en-US" sz="1400" b="1" dirty="0">
+              <a:latin typeface="Calibri" panose="020F0502020204030204" pitchFamily="34" charset="0"/>
+              <a:cs typeface="Calibri" panose="020F0502020204030204" pitchFamily="34" charset="0"/>
+            </a:endParaRPr>
+          </a:p>
+        </p:txBody>
+      </p:sp>
+      <p:sp>
+        <p:nvSpPr>
+          <p:cNvPr id="20" name="Rectangle 19">
+            <a:extLst>
+              <a:ext uri="{FF2B5EF4-FFF2-40B4-BE49-F238E27FC236}">
+                <a16:creationId xmlns:a16="http://schemas.microsoft.com/office/drawing/2014/main" id="{9726C7CD-6A87-F646-ABF6-3851C7229418}"/>
+              </a:ext>
+            </a:extLst>
+          </p:cNvPr>
+          <p:cNvSpPr/>
+          <p:nvPr/>
+        </p:nvSpPr>
+        <p:spPr>
+          <a:xfrm>
+            <a:off x="6384494" y="1066990"/>
+            <a:ext cx="5397500" cy="2246769"/>
+          </a:xfrm>
+          <a:prstGeom prst="rect">
+            <a:avLst/>
+          </a:prstGeom>
+        </p:spPr>
+        <p:txBody>
+          <a:bodyPr wrap="square">
+            <a:spAutoFit/>
+          </a:bodyPr>
+          <a:lstStyle/>
+          <a:p>
+            <a:pPr marL="285750" indent="-285750" algn="just">
+              <a:buFont typeface="Arial" panose="020B0604020202020204" pitchFamily="34" charset="0"/>
+              <a:buChar char="•"/>
+            </a:pPr>
+            <a:r>
+              <a:rPr lang="en-US" sz="1400" dirty="0">
+                <a:latin typeface="Calibri" panose="020F0502020204030204" pitchFamily="34" charset="0"/>
+                <a:cs typeface="Calibri" panose="020F0502020204030204" pitchFamily="34" charset="0"/>
+              </a:rPr>
+              <a:t>…were on average, five years younger (55.6 compared to 60.6)</a:t>
+            </a:r>
+          </a:p>
+          <a:p>
+            <a:pPr marL="285750" indent="-285750" algn="just">
+              <a:buFont typeface="Arial" panose="020B0604020202020204" pitchFamily="34" charset="0"/>
+              <a:buChar char="•"/>
+            </a:pPr>
+            <a:r>
+              <a:rPr lang="en-US" sz="1400" dirty="0">
+                <a:latin typeface="Calibri" panose="020F0502020204030204" pitchFamily="34" charset="0"/>
+                <a:cs typeface="Calibri" panose="020F0502020204030204" pitchFamily="34" charset="0"/>
+              </a:rPr>
+              <a:t>…had greater levels of residential deprivation (31.3% of non-White patients lived in the most deprived </a:t>
+            </a:r>
+            <a:r>
+              <a:rPr lang="en-US" sz="1400" dirty="0" err="1">
+                <a:latin typeface="Calibri" panose="020F0502020204030204" pitchFamily="34" charset="0"/>
+                <a:cs typeface="Calibri" panose="020F0502020204030204" pitchFamily="34" charset="0"/>
+              </a:rPr>
+              <a:t>neighbourhoods</a:t>
+            </a:r>
+            <a:r>
+              <a:rPr lang="en-US" sz="1400" dirty="0">
+                <a:latin typeface="Calibri" panose="020F0502020204030204" pitchFamily="34" charset="0"/>
+                <a:cs typeface="Calibri" panose="020F0502020204030204" pitchFamily="34" charset="0"/>
+              </a:rPr>
+              <a:t> in England compared to 21.9% of White patients).</a:t>
+            </a:r>
+          </a:p>
+          <a:p>
+            <a:pPr marL="285750" indent="-285750" algn="just">
+              <a:buFont typeface="Arial" panose="020B0604020202020204" pitchFamily="34" charset="0"/>
+              <a:buChar char="•"/>
+            </a:pPr>
+            <a:r>
+              <a:rPr lang="en-US" sz="1400" dirty="0">
+                <a:latin typeface="Calibri" panose="020F0502020204030204" pitchFamily="34" charset="0"/>
+                <a:cs typeface="Calibri" panose="020F0502020204030204" pitchFamily="34" charset="0"/>
+              </a:rPr>
+              <a:t>…had lower rates of dependency on support for daily activities prior to admission (6.5% compared with 10.8%).</a:t>
+            </a:r>
+          </a:p>
+          <a:p>
+            <a:pPr marL="285750" indent="-285750" algn="just">
+              <a:buFont typeface="Arial" panose="020B0604020202020204" pitchFamily="34" charset="0"/>
+              <a:buChar char="•"/>
+            </a:pPr>
+            <a:r>
+              <a:rPr lang="en-US" sz="1400" dirty="0">
+                <a:latin typeface="Calibri" panose="020F0502020204030204" pitchFamily="34" charset="0"/>
+                <a:cs typeface="Calibri" panose="020F0502020204030204" pitchFamily="34" charset="0"/>
+              </a:rPr>
+              <a:t>…had lower rates of severe severe comorbidities (except renal comorbidities).</a:t>
+            </a:r>
+          </a:p>
+          <a:p>
+            <a:pPr marL="285750" indent="-285750" algn="just">
+              <a:buFont typeface="Arial" panose="020B0604020202020204" pitchFamily="34" charset="0"/>
+              <a:buChar char="•"/>
+            </a:pPr>
+            <a:r>
+              <a:rPr lang="en-US" sz="1400" dirty="0">
+                <a:latin typeface="Calibri" panose="020F0502020204030204" pitchFamily="34" charset="0"/>
+                <a:cs typeface="Calibri" panose="020F0502020204030204" pitchFamily="34" charset="0"/>
+              </a:rPr>
+              <a:t>…had higher rates of requiring mechanical ventilation in the first 24 hours of critical care (68.8% compared to 57.8% of White patients).</a:t>
+            </a:r>
+          </a:p>
+        </p:txBody>
+      </p:sp>
+      <p:sp>
+        <p:nvSpPr>
+          <p:cNvPr id="21" name="Rectangle 20">
+            <a:extLst>
+              <a:ext uri="{FF2B5EF4-FFF2-40B4-BE49-F238E27FC236}">
+                <a16:creationId xmlns:a16="http://schemas.microsoft.com/office/drawing/2014/main" id="{3BC1BFFD-006A-F34C-BB98-49EFBC366E20}"/>
+              </a:ext>
+            </a:extLst>
+          </p:cNvPr>
+          <p:cNvSpPr/>
+          <p:nvPr/>
+        </p:nvSpPr>
+        <p:spPr>
+          <a:xfrm>
+            <a:off x="7709732" y="3444118"/>
+            <a:ext cx="4177465" cy="954107"/>
+          </a:xfrm>
+          <a:prstGeom prst="rect">
+            <a:avLst/>
+          </a:prstGeom>
+        </p:spPr>
+        <p:txBody>
+          <a:bodyPr wrap="square">
+            <a:spAutoFit/>
+          </a:bodyPr>
+          <a:lstStyle/>
+          <a:p>
+            <a:pPr algn="just"/>
+            <a:r>
+              <a:rPr lang="en-GB" sz="1400" dirty="0">
+                <a:solidFill>
+                  <a:srgbClr val="13171D"/>
+                </a:solidFill>
+                <a:latin typeface="Calibri" panose="020F0502020204030204" pitchFamily="34" charset="0"/>
+                <a:cs typeface="Calibri" panose="020F0502020204030204" pitchFamily="34" charset="0"/>
+              </a:rPr>
+              <a:t>Higher proportions of those receiving advanced respiratory support were from BAME groups (35.2%) compared to 23.8% who did not require advanced respiratory support.</a:t>
+            </a:r>
+            <a:endParaRPr lang="en-US" sz="1400" dirty="0">
+              <a:latin typeface="Calibri" panose="020F0502020204030204" pitchFamily="34" charset="0"/>
+              <a:cs typeface="Calibri" panose="020F0502020204030204" pitchFamily="34" charset="0"/>
+            </a:endParaRPr>
+          </a:p>
+        </p:txBody>
+      </p:sp>
+      <p:pic>
+        <p:nvPicPr>
+          <p:cNvPr id="3" name="Picture 2">
+            <a:extLst>
+              <a:ext uri="{FF2B5EF4-FFF2-40B4-BE49-F238E27FC236}">
+                <a16:creationId xmlns:a16="http://schemas.microsoft.com/office/drawing/2014/main" id="{F32DB561-D804-794C-BEA3-8A60D94BD1A3}"/>
+              </a:ext>
+            </a:extLst>
+          </p:cNvPr>
+          <p:cNvPicPr>
+            <a:picLocks noChangeAspect="1"/>
+          </p:cNvPicPr>
+          <p:nvPr/>
+        </p:nvPicPr>
+        <p:blipFill>
+          <a:blip r:embed="rId4"/>
+          <a:stretch>
+            <a:fillRect/>
+          </a:stretch>
+        </p:blipFill>
+        <p:spPr>
+          <a:xfrm>
+            <a:off x="6719133" y="3444118"/>
+            <a:ext cx="990600" cy="990600"/>
+          </a:xfrm>
+          <a:prstGeom prst="rect">
+            <a:avLst/>
+          </a:prstGeom>
+        </p:spPr>
+      </p:pic>
+      <p:sp>
+        <p:nvSpPr>
+          <p:cNvPr id="22" name="Rectangle 21">
+            <a:extLst>
+              <a:ext uri="{FF2B5EF4-FFF2-40B4-BE49-F238E27FC236}">
+                <a16:creationId xmlns:a16="http://schemas.microsoft.com/office/drawing/2014/main" id="{53917A09-2798-4240-9F77-CA2233E0716B}"/>
+              </a:ext>
+            </a:extLst>
+          </p:cNvPr>
+          <p:cNvSpPr/>
+          <p:nvPr/>
+        </p:nvSpPr>
+        <p:spPr>
+          <a:xfrm>
+            <a:off x="7709733" y="4650618"/>
+            <a:ext cx="4177466" cy="738664"/>
+          </a:xfrm>
+          <a:prstGeom prst="rect">
+            <a:avLst/>
+          </a:prstGeom>
+        </p:spPr>
+        <p:txBody>
+          <a:bodyPr wrap="square">
+            <a:spAutoFit/>
+          </a:bodyPr>
+          <a:lstStyle/>
+          <a:p>
+            <a:pPr algn="just"/>
+            <a:r>
+              <a:rPr lang="en-GB" sz="1400" dirty="0">
+                <a:solidFill>
+                  <a:srgbClr val="13171D"/>
+                </a:solidFill>
+                <a:latin typeface="Calibri" panose="020F0502020204030204" pitchFamily="34" charset="0"/>
+                <a:cs typeface="Calibri" panose="020F0502020204030204" pitchFamily="34" charset="0"/>
+              </a:rPr>
+              <a:t>Similarly, higher proportions of those receiving renal support were from BAME groups (39.3%) compared to 29.7% who did not require renal support.</a:t>
+            </a:r>
+            <a:endParaRPr lang="en-US" sz="1400" dirty="0">
+              <a:latin typeface="Calibri" panose="020F0502020204030204" pitchFamily="34" charset="0"/>
+              <a:cs typeface="Calibri" panose="020F0502020204030204" pitchFamily="34" charset="0"/>
+            </a:endParaRPr>
+          </a:p>
+        </p:txBody>
+      </p:sp>
+      <p:sp>
+        <p:nvSpPr>
+          <p:cNvPr id="23" name="Rectangle 22">
+            <a:extLst>
+              <a:ext uri="{FF2B5EF4-FFF2-40B4-BE49-F238E27FC236}">
+                <a16:creationId xmlns:a16="http://schemas.microsoft.com/office/drawing/2014/main" id="{16E1FFDF-7B95-FC40-AA42-B08801C7DE7B}"/>
+              </a:ext>
+            </a:extLst>
+          </p:cNvPr>
+          <p:cNvSpPr/>
+          <p:nvPr/>
+        </p:nvSpPr>
+        <p:spPr>
+          <a:xfrm>
+            <a:off x="9516104" y="6627168"/>
+            <a:ext cx="6088392" cy="230832"/>
+          </a:xfrm>
+          <a:prstGeom prst="rect">
+            <a:avLst/>
+          </a:prstGeom>
+        </p:spPr>
+        <p:txBody>
+          <a:bodyPr wrap="square">
+            <a:spAutoFit/>
+          </a:bodyPr>
+          <a:lstStyle/>
+          <a:p>
+            <a:r>
+              <a:rPr lang="en-GB" sz="900" dirty="0"/>
+              <a:t>Infographic images designed by </a:t>
+            </a:r>
+            <a:r>
+              <a:rPr lang="en-GB" sz="900" dirty="0" err="1"/>
+              <a:t>Freepik</a:t>
+            </a:r>
+            <a:r>
+              <a:rPr lang="en-GB" sz="900" dirty="0"/>
+              <a:t> from </a:t>
+            </a:r>
+            <a:r>
+              <a:rPr lang="en-GB" sz="900" dirty="0" err="1"/>
+              <a:t>Flaticon</a:t>
+            </a:r>
+            <a:endParaRPr lang="en-GB" sz="900" dirty="0">
+              <a:effectLst/>
+              <a:latin typeface="Calibri" panose="020F0502020204030204" pitchFamily="34" charset="0"/>
+              <a:cs typeface="Calibri" panose="020F0502020204030204" pitchFamily="34" charset="0"/>
+            </a:endParaRPr>
+          </a:p>
+        </p:txBody>
+      </p:sp>
+      <p:pic>
+        <p:nvPicPr>
+          <p:cNvPr id="7" name="Graphic 6" descr="Kidneys">
+            <a:extLst>
+              <a:ext uri="{FF2B5EF4-FFF2-40B4-BE49-F238E27FC236}">
+                <a16:creationId xmlns:a16="http://schemas.microsoft.com/office/drawing/2014/main" id="{03AFDC53-8FFC-C846-83CE-AAF67EA7FCDA}"/>
+              </a:ext>
+            </a:extLst>
+          </p:cNvPr>
+          <p:cNvPicPr>
+            <a:picLocks noChangeAspect="1"/>
+          </p:cNvPicPr>
+          <p:nvPr/>
+        </p:nvPicPr>
+        <p:blipFill>
+          <a:blip r:embed="rId5">
+            <a:extLst>
+              <a:ext uri="{96DAC541-7B7A-43D3-8B79-37D633B846F1}">
+                <asvg:svgBlip xmlns:asvg="http://schemas.microsoft.com/office/drawing/2016/SVG/main" r:embed="rId6"/>
+              </a:ext>
+            </a:extLst>
+          </a:blip>
+          <a:stretch>
+            <a:fillRect/>
+          </a:stretch>
+        </p:blipFill>
+        <p:spPr>
+          <a:xfrm>
+            <a:off x="6757233" y="4562750"/>
+            <a:ext cx="914400" cy="914400"/>
+          </a:xfrm>
+          <a:prstGeom prst="rect">
+            <a:avLst/>
+          </a:prstGeom>
+        </p:spPr>
+      </p:pic>
+      <p:sp>
+        <p:nvSpPr>
+          <p:cNvPr id="11" name="Rectangle 10">
+            <a:extLst>
+              <a:ext uri="{FF2B5EF4-FFF2-40B4-BE49-F238E27FC236}">
+                <a16:creationId xmlns:a16="http://schemas.microsoft.com/office/drawing/2014/main" id="{8622EAAB-7954-824C-9F47-C6FA68702014}"/>
+              </a:ext>
+            </a:extLst>
+          </p:cNvPr>
+          <p:cNvSpPr/>
+          <p:nvPr/>
+        </p:nvSpPr>
+        <p:spPr>
+          <a:xfrm>
+            <a:off x="2925770" y="1473632"/>
+            <a:ext cx="2227787" cy="707886"/>
+          </a:xfrm>
+          <a:prstGeom prst="rect">
+            <a:avLst/>
+          </a:prstGeom>
+        </p:spPr>
+        <p:txBody>
+          <a:bodyPr wrap="square">
+            <a:spAutoFit/>
+          </a:bodyPr>
+          <a:lstStyle/>
+          <a:p>
+            <a:pPr algn="just"/>
+            <a:r>
+              <a:rPr lang="en-GB" sz="1000" b="1" dirty="0">
+                <a:solidFill>
+                  <a:srgbClr val="13171D"/>
+                </a:solidFill>
+                <a:latin typeface="Calibri" panose="020F0502020204030204" pitchFamily="34" charset="0"/>
+                <a:cs typeface="Calibri" panose="020F0502020204030204" pitchFamily="34" charset="0"/>
+              </a:rPr>
+              <a:t>One in seven patients were Black, which is twice the proportion of Black people estimated to live in the general population (one in 14)</a:t>
+            </a:r>
+            <a:endParaRPr lang="en-US" sz="1000" b="1" dirty="0">
+              <a:latin typeface="Calibri" panose="020F0502020204030204" pitchFamily="34" charset="0"/>
+              <a:cs typeface="Calibri" panose="020F0502020204030204" pitchFamily="34" charset="0"/>
+            </a:endParaRPr>
+          </a:p>
+        </p:txBody>
+      </p:sp>
+      <p:sp>
+        <p:nvSpPr>
+          <p:cNvPr id="24" name="Rectangle 23">
+            <a:extLst>
+              <a:ext uri="{FF2B5EF4-FFF2-40B4-BE49-F238E27FC236}">
+                <a16:creationId xmlns:a16="http://schemas.microsoft.com/office/drawing/2014/main" id="{41CD70DC-7808-5D4F-9312-4B8CA76B3E79}"/>
+              </a:ext>
+            </a:extLst>
+          </p:cNvPr>
+          <p:cNvSpPr/>
+          <p:nvPr/>
+        </p:nvSpPr>
+        <p:spPr>
+          <a:xfrm>
+            <a:off x="288910" y="1475226"/>
+            <a:ext cx="2396496" cy="707886"/>
+          </a:xfrm>
+          <a:prstGeom prst="rect">
+            <a:avLst/>
+          </a:prstGeom>
+        </p:spPr>
+        <p:txBody>
+          <a:bodyPr wrap="square">
+            <a:spAutoFit/>
+          </a:bodyPr>
+          <a:lstStyle/>
+          <a:p>
+            <a:pPr algn="just"/>
+            <a:r>
+              <a:rPr lang="en-GB" sz="1000" b="1" dirty="0">
+                <a:solidFill>
+                  <a:srgbClr val="13171D"/>
+                </a:solidFill>
+                <a:latin typeface="Calibri" panose="020F0502020204030204" pitchFamily="34" charset="0"/>
+                <a:cs typeface="Calibri" panose="020F0502020204030204" pitchFamily="34" charset="0"/>
+              </a:rPr>
+              <a:t>Fewer people from White and Mixed ethnicity backgrounds were admitted to intensive care given the demographics of the areas in which patients live</a:t>
+            </a:r>
+            <a:endParaRPr lang="en-US" sz="1000" b="1" dirty="0">
+              <a:latin typeface="Calibri" panose="020F0502020204030204" pitchFamily="34" charset="0"/>
+              <a:cs typeface="Calibri" panose="020F0502020204030204" pitchFamily="34" charset="0"/>
+            </a:endParaRPr>
+          </a:p>
+        </p:txBody>
+      </p:sp>
+      <p:sp>
+        <p:nvSpPr>
+          <p:cNvPr id="16" name="Rectangle 15">
+            <a:extLst>
+              <a:ext uri="{FF2B5EF4-FFF2-40B4-BE49-F238E27FC236}">
+                <a16:creationId xmlns:a16="http://schemas.microsoft.com/office/drawing/2014/main" id="{B9804188-0242-AB47-8B49-F689BB1518A1}"/>
+              </a:ext>
+            </a:extLst>
+          </p:cNvPr>
+          <p:cNvSpPr/>
+          <p:nvPr/>
+        </p:nvSpPr>
+        <p:spPr>
+          <a:xfrm>
+            <a:off x="7709732" y="5604725"/>
+            <a:ext cx="4177467" cy="954107"/>
+          </a:xfrm>
+          <a:prstGeom prst="rect">
+            <a:avLst/>
+          </a:prstGeom>
+        </p:spPr>
+        <p:txBody>
+          <a:bodyPr wrap="square">
+            <a:spAutoFit/>
+          </a:bodyPr>
+          <a:lstStyle/>
+          <a:p>
+            <a:pPr algn="just"/>
+            <a:r>
+              <a:rPr lang="en-GB" sz="1400" dirty="0">
+                <a:solidFill>
+                  <a:srgbClr val="13171D"/>
+                </a:solidFill>
+                <a:latin typeface="Calibri" panose="020F0502020204030204" pitchFamily="34" charset="0"/>
+                <a:cs typeface="Calibri" panose="020F0502020204030204" pitchFamily="34" charset="0"/>
+              </a:rPr>
+              <a:t>58% of White patients were discharged alive from critical care compared to 51.8% of Mixed, 50.9% of Asian, and 53% of Black ethnic groups. 62.4% of ’other’ ethnic groups were discharged alive from critical care.</a:t>
+            </a:r>
+            <a:endParaRPr lang="en-US" sz="1400" dirty="0">
+              <a:latin typeface="Calibri" panose="020F0502020204030204" pitchFamily="34" charset="0"/>
+              <a:cs typeface="Calibri" panose="020F0502020204030204" pitchFamily="34" charset="0"/>
+            </a:endParaRPr>
+          </a:p>
+        </p:txBody>
+      </p:sp>
+      <p:pic>
+        <p:nvPicPr>
+          <p:cNvPr id="4" name="Graphic 3" descr="Medical">
+            <a:extLst>
+              <a:ext uri="{FF2B5EF4-FFF2-40B4-BE49-F238E27FC236}">
+                <a16:creationId xmlns:a16="http://schemas.microsoft.com/office/drawing/2014/main" id="{901DA4B0-EE3C-604D-A35E-9306CE16D14E}"/>
+              </a:ext>
+            </a:extLst>
+          </p:cNvPr>
+          <p:cNvPicPr>
+            <a:picLocks noChangeAspect="1"/>
+          </p:cNvPicPr>
+          <p:nvPr/>
+        </p:nvPicPr>
+        <p:blipFill>
+          <a:blip r:embed="rId7">
+            <a:extLst>
+              <a:ext uri="{96DAC541-7B7A-43D3-8B79-37D633B846F1}">
+                <asvg:svgBlip xmlns:asvg="http://schemas.microsoft.com/office/drawing/2016/SVG/main" r:embed="rId8"/>
+              </a:ext>
+            </a:extLst>
+          </a:blip>
+          <a:stretch>
+            <a:fillRect/>
+          </a:stretch>
+        </p:blipFill>
+        <p:spPr>
+          <a:xfrm>
+            <a:off x="6757233" y="5604725"/>
+            <a:ext cx="914400" cy="914400"/>
+          </a:xfrm>
+          <a:prstGeom prst="rect">
+            <a:avLst/>
+          </a:prstGeom>
+        </p:spPr>
+      </p:pic>
+    </p:spTree>
+    <p:extLst>
+      <p:ext uri="{BB962C8B-B14F-4D97-AF65-F5344CB8AC3E}">
+        <p14:creationId xmlns:p14="http://schemas.microsoft.com/office/powerpoint/2010/main" val="3904588396"/>
+      </p:ext>
+    </p:extLst>
+  </p:cSld>
+  <p:clrMapOvr>
+    <a:masterClrMapping/>
+  </p:clrMapOvr>
+</p:sld>
+</file>
+
+<file path=ppt/slides/slide4.xml><?xml version="1.0" encoding="utf-8"?>
+<p:sld xmlns:a="http://schemas.openxmlformats.org/drawingml/2006/main" xmlns:r="http://schemas.openxmlformats.org/officeDocument/2006/relationships" xmlns:p="http://schemas.openxmlformats.org/presentationml/2006/main">
+  <p:cSld>
+    <p:spTree>
+      <p:nvGrpSpPr>
+        <p:cNvPr id="1" name=""/>
+        <p:cNvGrpSpPr/>
+        <p:nvPr/>
+      </p:nvGrpSpPr>
+      <p:grpSpPr>
+        <a:xfrm>
+          <a:off x="0" y="0"/>
+          <a:ext cx="0" cy="0"/>
+          <a:chOff x="0" y="0"/>
+          <a:chExt cx="0" cy="0"/>
+        </a:xfrm>
+      </p:grpSpPr>
+      <p:sp>
+        <p:nvSpPr>
+          <p:cNvPr id="3" name="Rectangle 2">
+            <a:extLst>
+              <a:ext uri="{FF2B5EF4-FFF2-40B4-BE49-F238E27FC236}">
+                <a16:creationId xmlns:a16="http://schemas.microsoft.com/office/drawing/2014/main" id="{CE95FCE3-A7DB-7C43-91F3-1C222839D757}"/>
+              </a:ext>
+            </a:extLst>
+          </p:cNvPr>
+          <p:cNvSpPr/>
+          <p:nvPr/>
+        </p:nvSpPr>
+        <p:spPr>
+          <a:xfrm>
+            <a:off x="50942" y="6389888"/>
+            <a:ext cx="1353671" cy="338554"/>
+          </a:xfrm>
+          <a:prstGeom prst="rect">
+            <a:avLst/>
+          </a:prstGeom>
+        </p:spPr>
+        <p:txBody>
+          <a:bodyPr wrap="square">
+            <a:spAutoFit/>
+          </a:bodyPr>
+          <a:lstStyle/>
+          <a:p>
+            <a:r>
+              <a:rPr lang="en-GB" sz="800" dirty="0">
+                <a:latin typeface="Calibri" panose="020F0502020204030204" pitchFamily="34" charset="0"/>
+                <a:cs typeface="Calibri" panose="020F0502020204030204" pitchFamily="34" charset="0"/>
+              </a:rPr>
+              <a:t>Ethnicity is know for 99.4% of deaths reported to PHE</a:t>
+            </a:r>
+          </a:p>
+        </p:txBody>
+      </p:sp>
+      <p:sp>
+        <p:nvSpPr>
+          <p:cNvPr id="5" name="Rectangle 4">
+            <a:extLst>
+              <a:ext uri="{FF2B5EF4-FFF2-40B4-BE49-F238E27FC236}">
+                <a16:creationId xmlns:a16="http://schemas.microsoft.com/office/drawing/2014/main" id="{37742200-B0E4-9A42-A49A-C239AF0E7C09}"/>
+              </a:ext>
+            </a:extLst>
+          </p:cNvPr>
+          <p:cNvSpPr/>
+          <p:nvPr/>
+        </p:nvSpPr>
+        <p:spPr>
+          <a:xfrm>
+            <a:off x="-7608" y="0"/>
+            <a:ext cx="12192000" cy="606582"/>
+          </a:xfrm>
+          <a:prstGeom prst="rect">
+            <a:avLst/>
+          </a:prstGeom>
+          <a:solidFill>
+            <a:srgbClr val="8E8E8E"/>
+          </a:solidFill>
+          <a:ln>
+            <a:solidFill>
+              <a:schemeClr val="tx2">
+                <a:lumMod val="20000"/>
+                <a:lumOff val="80000"/>
+              </a:schemeClr>
+            </a:solidFill>
+          </a:ln>
+        </p:spPr>
+        <p:style>
+          <a:lnRef idx="2">
+            <a:schemeClr val="accent1">
+              <a:shade val="50000"/>
+            </a:schemeClr>
+          </a:lnRef>
+          <a:fillRef idx="1">
+            <a:schemeClr val="accent1"/>
+          </a:fillRef>
+          <a:effectRef idx="0">
+            <a:schemeClr val="accent1"/>
+          </a:effectRef>
+          <a:fontRef idx="minor">
+            <a:schemeClr val="lt1"/>
+          </a:fontRef>
+        </p:style>
+        <p:txBody>
+          <a:bodyPr rtlCol="0" anchor="ctr"/>
+          <a:lstStyle/>
+          <a:p>
+            <a:pPr algn="ctr"/>
+            <a:endParaRPr lang="en-US" sz="800" dirty="0">
+              <a:latin typeface="Verdana" panose="020B0604030504040204" pitchFamily="34" charset="0"/>
+              <a:ea typeface="Verdana" panose="020B0604030504040204" pitchFamily="34" charset="0"/>
+              <a:cs typeface="Verdana" panose="020B0604030504040204" pitchFamily="34" charset="0"/>
+            </a:endParaRPr>
+          </a:p>
+        </p:txBody>
+      </p:sp>
+      <p:sp>
+        <p:nvSpPr>
+          <p:cNvPr id="6" name="TextBox 5">
+            <a:extLst>
+              <a:ext uri="{FF2B5EF4-FFF2-40B4-BE49-F238E27FC236}">
+                <a16:creationId xmlns:a16="http://schemas.microsoft.com/office/drawing/2014/main" id="{DDEC3DFA-C69E-314D-A3B3-4D72ED973B02}"/>
+              </a:ext>
+            </a:extLst>
+          </p:cNvPr>
+          <p:cNvSpPr txBox="1"/>
+          <p:nvPr/>
+        </p:nvSpPr>
+        <p:spPr>
+          <a:xfrm>
+            <a:off x="33012" y="147488"/>
+            <a:ext cx="12628892" cy="307777"/>
+          </a:xfrm>
+          <a:prstGeom prst="rect">
+            <a:avLst/>
+          </a:prstGeom>
+          <a:noFill/>
+        </p:spPr>
+        <p:txBody>
+          <a:bodyPr wrap="square" rtlCol="0">
+            <a:spAutoFit/>
+          </a:bodyPr>
+          <a:lstStyle/>
+          <a:p>
+            <a:r>
+              <a:rPr lang="en-GB" sz="1400" b="1" dirty="0">
+                <a:solidFill>
+                  <a:schemeClr val="bg1"/>
+                </a:solidFill>
+                <a:latin typeface="Calibri" panose="020F0502020204030204" pitchFamily="34" charset="0"/>
+                <a:cs typeface="Calibri" panose="020F0502020204030204" pitchFamily="34" charset="0"/>
+              </a:rPr>
+              <a:t>Deaths reported to Public Health England up to 13/05/2020 (29,673 deaths confirmed)</a:t>
+            </a:r>
+            <a:endParaRPr lang="en-US" sz="1400" b="1" dirty="0">
+              <a:solidFill>
+                <a:schemeClr val="bg1"/>
+              </a:solidFill>
+              <a:latin typeface="Verdana" panose="020B0604030504040204" pitchFamily="34" charset="0"/>
+              <a:ea typeface="Verdana" panose="020B0604030504040204" pitchFamily="34" charset="0"/>
+              <a:cs typeface="Verdana" panose="020B0604030504040204" pitchFamily="34" charset="0"/>
+            </a:endParaRPr>
+          </a:p>
+        </p:txBody>
+      </p:sp>
+      <p:pic>
+        <p:nvPicPr>
+          <p:cNvPr id="7" name="Picture 6">
+            <a:extLst>
+              <a:ext uri="{FF2B5EF4-FFF2-40B4-BE49-F238E27FC236}">
+                <a16:creationId xmlns:a16="http://schemas.microsoft.com/office/drawing/2014/main" id="{78297ACA-2D47-D343-B6E4-537C101080B1}"/>
+              </a:ext>
+            </a:extLst>
+          </p:cNvPr>
+          <p:cNvPicPr>
+            <a:picLocks noChangeAspect="1"/>
+          </p:cNvPicPr>
+          <p:nvPr/>
+        </p:nvPicPr>
+        <p:blipFill>
+          <a:blip r:embed="rId3"/>
+          <a:srcRect/>
+          <a:stretch/>
+        </p:blipFill>
+        <p:spPr>
+          <a:xfrm>
+            <a:off x="1756451" y="1749010"/>
+            <a:ext cx="4480626" cy="2216690"/>
+          </a:xfrm>
+          <a:prstGeom prst="rect">
+            <a:avLst/>
+          </a:prstGeom>
+        </p:spPr>
+      </p:pic>
+      <p:sp>
+        <p:nvSpPr>
+          <p:cNvPr id="8" name="Rectangle 7">
+            <a:extLst>
+              <a:ext uri="{FF2B5EF4-FFF2-40B4-BE49-F238E27FC236}">
+                <a16:creationId xmlns:a16="http://schemas.microsoft.com/office/drawing/2014/main" id="{B4706461-E4E5-7C45-A5E8-27843170A376}"/>
+              </a:ext>
+            </a:extLst>
+          </p:cNvPr>
+          <p:cNvSpPr/>
+          <p:nvPr/>
+        </p:nvSpPr>
+        <p:spPr>
+          <a:xfrm>
+            <a:off x="1570926" y="1538345"/>
+            <a:ext cx="5045311" cy="261610"/>
+          </a:xfrm>
+          <a:prstGeom prst="rect">
+            <a:avLst/>
+          </a:prstGeom>
+        </p:spPr>
+        <p:txBody>
+          <a:bodyPr wrap="square">
+            <a:spAutoFit/>
+          </a:bodyPr>
+          <a:lstStyle/>
+          <a:p>
+            <a:r>
+              <a:rPr lang="en-GB" sz="1100" b="1" dirty="0">
+                <a:latin typeface="Calibri" panose="020F0502020204030204" pitchFamily="34" charset="0"/>
+                <a:cs typeface="Calibri" panose="020F0502020204030204" pitchFamily="34" charset="0"/>
+              </a:rPr>
+              <a:t>Age standardised mortality rates by ethnicity and sex, as of 13 May 2020, England. </a:t>
+            </a:r>
+          </a:p>
+        </p:txBody>
+      </p:sp>
+      <p:sp>
+        <p:nvSpPr>
+          <p:cNvPr id="9" name="Rectangle 8">
+            <a:extLst>
+              <a:ext uri="{FF2B5EF4-FFF2-40B4-BE49-F238E27FC236}">
+                <a16:creationId xmlns:a16="http://schemas.microsoft.com/office/drawing/2014/main" id="{9713846A-BF42-4549-AD18-8A62E5D774F7}"/>
+              </a:ext>
+            </a:extLst>
+          </p:cNvPr>
+          <p:cNvSpPr/>
+          <p:nvPr/>
+        </p:nvSpPr>
+        <p:spPr>
+          <a:xfrm>
+            <a:off x="2907754" y="3976700"/>
+            <a:ext cx="6096000" cy="230832"/>
+          </a:xfrm>
+          <a:prstGeom prst="rect">
+            <a:avLst/>
+          </a:prstGeom>
+        </p:spPr>
+        <p:txBody>
+          <a:bodyPr>
+            <a:spAutoFit/>
+          </a:bodyPr>
+          <a:lstStyle/>
+          <a:p>
+            <a:r>
+              <a:rPr lang="en-GB" sz="900" dirty="0">
+                <a:latin typeface="Calibri" panose="020F0502020204030204" pitchFamily="34" charset="0"/>
+                <a:cs typeface="Calibri" panose="020F0502020204030204" pitchFamily="34" charset="0"/>
+              </a:rPr>
+              <a:t>Source: Public Health England Second Generation Surveillance System.</a:t>
+            </a:r>
+            <a:endParaRPr lang="en-US" sz="900" dirty="0"/>
+          </a:p>
+        </p:txBody>
+      </p:sp>
+      <p:sp>
+        <p:nvSpPr>
+          <p:cNvPr id="2" name="Rectangle 1">
+            <a:extLst>
+              <a:ext uri="{FF2B5EF4-FFF2-40B4-BE49-F238E27FC236}">
+                <a16:creationId xmlns:a16="http://schemas.microsoft.com/office/drawing/2014/main" id="{71B071E0-9905-1343-9333-818580B87290}"/>
+              </a:ext>
+            </a:extLst>
+          </p:cNvPr>
+          <p:cNvSpPr/>
+          <p:nvPr/>
+        </p:nvSpPr>
+        <p:spPr>
+          <a:xfrm>
+            <a:off x="93320" y="706620"/>
+            <a:ext cx="2949387" cy="646331"/>
+          </a:xfrm>
+          <a:prstGeom prst="rect">
+            <a:avLst/>
+          </a:prstGeom>
+        </p:spPr>
+        <p:txBody>
+          <a:bodyPr wrap="square">
+            <a:spAutoFit/>
+          </a:bodyPr>
+          <a:lstStyle/>
+          <a:p>
+            <a:r>
+              <a:rPr lang="en-GB" sz="1200" b="1" dirty="0">
+                <a:latin typeface="Calibri" panose="020F0502020204030204" pitchFamily="34" charset="0"/>
+                <a:cs typeface="Calibri" panose="020F0502020204030204" pitchFamily="34" charset="0"/>
+              </a:rPr>
+              <a:t>Death rates from Covid-19 were highest among people of Other ethnic backgrounds as well as Black ethnic groups. </a:t>
+            </a:r>
+          </a:p>
+        </p:txBody>
+      </p:sp>
+      <p:sp>
+        <p:nvSpPr>
+          <p:cNvPr id="11" name="Rectangle 10">
+            <a:extLst>
+              <a:ext uri="{FF2B5EF4-FFF2-40B4-BE49-F238E27FC236}">
+                <a16:creationId xmlns:a16="http://schemas.microsoft.com/office/drawing/2014/main" id="{87A8701D-74D7-1B42-80BD-1C29F00C3D67}"/>
+              </a:ext>
+            </a:extLst>
+          </p:cNvPr>
+          <p:cNvSpPr/>
+          <p:nvPr/>
+        </p:nvSpPr>
+        <p:spPr>
+          <a:xfrm>
+            <a:off x="4810611" y="5570000"/>
+            <a:ext cx="1058333" cy="646331"/>
+          </a:xfrm>
+          <a:prstGeom prst="rect">
+            <a:avLst/>
+          </a:prstGeom>
+        </p:spPr>
+        <p:txBody>
+          <a:bodyPr wrap="square">
+            <a:spAutoFit/>
+          </a:bodyPr>
+          <a:lstStyle/>
+          <a:p>
+            <a:r>
+              <a:rPr lang="en-GB" dirty="0">
+                <a:latin typeface="Calibri" panose="020F0502020204030204" pitchFamily="34" charset="0"/>
+                <a:cs typeface="Calibri" panose="020F0502020204030204" pitchFamily="34" charset="0"/>
+              </a:rPr>
+              <a:t>119 per 100,000</a:t>
+            </a:r>
+          </a:p>
+        </p:txBody>
+      </p:sp>
+      <p:sp>
+        <p:nvSpPr>
+          <p:cNvPr id="12" name="Rectangle 11">
+            <a:extLst>
+              <a:ext uri="{FF2B5EF4-FFF2-40B4-BE49-F238E27FC236}">
+                <a16:creationId xmlns:a16="http://schemas.microsoft.com/office/drawing/2014/main" id="{9F0CBE6E-27A5-6D43-B0A9-91EF58D32C5E}"/>
+              </a:ext>
+            </a:extLst>
+          </p:cNvPr>
+          <p:cNvSpPr/>
+          <p:nvPr/>
+        </p:nvSpPr>
+        <p:spPr>
+          <a:xfrm>
+            <a:off x="2888877" y="5553177"/>
+            <a:ext cx="1058333" cy="646331"/>
+          </a:xfrm>
+          <a:prstGeom prst="rect">
+            <a:avLst/>
+          </a:prstGeom>
+        </p:spPr>
+        <p:txBody>
+          <a:bodyPr wrap="square">
+            <a:spAutoFit/>
+          </a:bodyPr>
+          <a:lstStyle/>
+          <a:p>
+            <a:r>
+              <a:rPr lang="en-GB" dirty="0">
+                <a:latin typeface="Calibri" panose="020F0502020204030204" pitchFamily="34" charset="0"/>
+                <a:cs typeface="Calibri" panose="020F0502020204030204" pitchFamily="34" charset="0"/>
+              </a:rPr>
+              <a:t>257 per 100,000</a:t>
+            </a:r>
+          </a:p>
+        </p:txBody>
+      </p:sp>
+      <p:sp>
+        <p:nvSpPr>
+          <p:cNvPr id="13" name="Rectangle 12">
+            <a:extLst>
+              <a:ext uri="{FF2B5EF4-FFF2-40B4-BE49-F238E27FC236}">
+                <a16:creationId xmlns:a16="http://schemas.microsoft.com/office/drawing/2014/main" id="{AC2E5167-802E-8A4E-A536-6D5891274F11}"/>
+              </a:ext>
+            </a:extLst>
+          </p:cNvPr>
+          <p:cNvSpPr/>
+          <p:nvPr/>
+        </p:nvSpPr>
+        <p:spPr>
+          <a:xfrm>
+            <a:off x="4810611" y="4780625"/>
+            <a:ext cx="1058333" cy="646331"/>
+          </a:xfrm>
+          <a:prstGeom prst="rect">
+            <a:avLst/>
+          </a:prstGeom>
+        </p:spPr>
+        <p:txBody>
+          <a:bodyPr wrap="square">
+            <a:spAutoFit/>
+          </a:bodyPr>
+          <a:lstStyle/>
+          <a:p>
+            <a:r>
+              <a:rPr lang="en-GB" dirty="0">
+                <a:latin typeface="Calibri" panose="020F0502020204030204" pitchFamily="34" charset="0"/>
+                <a:cs typeface="Calibri" panose="020F0502020204030204" pitchFamily="34" charset="0"/>
+              </a:rPr>
+              <a:t>36 per 100,000</a:t>
+            </a:r>
+          </a:p>
+        </p:txBody>
+      </p:sp>
+      <p:sp>
+        <p:nvSpPr>
+          <p:cNvPr id="14" name="Rectangle 13">
+            <a:extLst>
+              <a:ext uri="{FF2B5EF4-FFF2-40B4-BE49-F238E27FC236}">
+                <a16:creationId xmlns:a16="http://schemas.microsoft.com/office/drawing/2014/main" id="{E787D015-BB2F-F54F-AEDD-B0949849584A}"/>
+              </a:ext>
+            </a:extLst>
+          </p:cNvPr>
+          <p:cNvSpPr/>
+          <p:nvPr/>
+        </p:nvSpPr>
+        <p:spPr>
+          <a:xfrm>
+            <a:off x="2888877" y="4763802"/>
+            <a:ext cx="1058333" cy="646331"/>
+          </a:xfrm>
+          <a:prstGeom prst="rect">
+            <a:avLst/>
+          </a:prstGeom>
+        </p:spPr>
+        <p:txBody>
+          <a:bodyPr wrap="square">
+            <a:spAutoFit/>
+          </a:bodyPr>
+          <a:lstStyle/>
+          <a:p>
+            <a:r>
+              <a:rPr lang="en-GB" dirty="0">
+                <a:latin typeface="Calibri" panose="020F0502020204030204" pitchFamily="34" charset="0"/>
+                <a:cs typeface="Calibri" panose="020F0502020204030204" pitchFamily="34" charset="0"/>
+              </a:rPr>
+              <a:t>70 per 100,000</a:t>
+            </a:r>
+          </a:p>
+        </p:txBody>
+      </p:sp>
+      <p:pic>
+        <p:nvPicPr>
+          <p:cNvPr id="15" name="Graphic 14" descr="Man and woman">
+            <a:extLst>
+              <a:ext uri="{FF2B5EF4-FFF2-40B4-BE49-F238E27FC236}">
+                <a16:creationId xmlns:a16="http://schemas.microsoft.com/office/drawing/2014/main" id="{88C2975A-474D-484F-A898-92002891C1B4}"/>
+              </a:ext>
+            </a:extLst>
+          </p:cNvPr>
+          <p:cNvPicPr>
+            <a:picLocks noChangeAspect="1"/>
+          </p:cNvPicPr>
+          <p:nvPr/>
+        </p:nvPicPr>
+        <p:blipFill>
+          <a:blip r:embed="rId4">
+            <a:extLst>
+              <a:ext uri="{96DAC541-7B7A-43D3-8B79-37D633B846F1}">
+                <asvg:svgBlip xmlns:asvg="http://schemas.microsoft.com/office/drawing/2016/SVG/main" r:embed="rId5"/>
+              </a:ext>
+            </a:extLst>
+          </a:blip>
+          <a:stretch>
+            <a:fillRect/>
+          </a:stretch>
+        </p:blipFill>
+        <p:spPr>
+          <a:xfrm>
+            <a:off x="3831115" y="4566563"/>
+            <a:ext cx="914400" cy="914400"/>
+          </a:xfrm>
+          <a:prstGeom prst="rect">
+            <a:avLst/>
+          </a:prstGeom>
+        </p:spPr>
+      </p:pic>
+      <p:sp>
+        <p:nvSpPr>
+          <p:cNvPr id="16" name="Rectangle 15">
+            <a:extLst>
+              <a:ext uri="{FF2B5EF4-FFF2-40B4-BE49-F238E27FC236}">
+                <a16:creationId xmlns:a16="http://schemas.microsoft.com/office/drawing/2014/main" id="{CCBA258C-FE5A-D84C-AE7B-5CBC5854CE72}"/>
+              </a:ext>
+            </a:extLst>
+          </p:cNvPr>
+          <p:cNvSpPr/>
+          <p:nvPr/>
+        </p:nvSpPr>
+        <p:spPr>
+          <a:xfrm>
+            <a:off x="2134440" y="4894371"/>
+            <a:ext cx="766941" cy="369332"/>
+          </a:xfrm>
+          <a:prstGeom prst="rect">
+            <a:avLst/>
+          </a:prstGeom>
+        </p:spPr>
+        <p:txBody>
+          <a:bodyPr wrap="none">
+            <a:spAutoFit/>
+          </a:bodyPr>
+          <a:lstStyle/>
+          <a:p>
+            <a:r>
+              <a:rPr lang="en-GB" b="1" dirty="0"/>
+              <a:t>White</a:t>
+            </a:r>
+          </a:p>
+        </p:txBody>
+      </p:sp>
+      <p:sp>
+        <p:nvSpPr>
+          <p:cNvPr id="17" name="Rectangle 16">
+            <a:extLst>
+              <a:ext uri="{FF2B5EF4-FFF2-40B4-BE49-F238E27FC236}">
+                <a16:creationId xmlns:a16="http://schemas.microsoft.com/office/drawing/2014/main" id="{9EFEDB73-AEC6-5042-884C-ACC9FFDD31B1}"/>
+              </a:ext>
+            </a:extLst>
+          </p:cNvPr>
+          <p:cNvSpPr/>
+          <p:nvPr/>
+        </p:nvSpPr>
+        <p:spPr>
+          <a:xfrm>
+            <a:off x="2134440" y="5667783"/>
+            <a:ext cx="691215" cy="369332"/>
+          </a:xfrm>
+          <a:prstGeom prst="rect">
+            <a:avLst/>
+          </a:prstGeom>
+        </p:spPr>
+        <p:txBody>
+          <a:bodyPr wrap="none">
+            <a:spAutoFit/>
+          </a:bodyPr>
+          <a:lstStyle/>
+          <a:p>
+            <a:r>
+              <a:rPr lang="en-GB" b="1" dirty="0"/>
+              <a:t>Black</a:t>
+            </a:r>
+          </a:p>
+        </p:txBody>
+      </p:sp>
+      <p:sp>
+        <p:nvSpPr>
+          <p:cNvPr id="18" name="Rectangle 17">
+            <a:extLst>
+              <a:ext uri="{FF2B5EF4-FFF2-40B4-BE49-F238E27FC236}">
+                <a16:creationId xmlns:a16="http://schemas.microsoft.com/office/drawing/2014/main" id="{315B8E00-AA42-B34B-A96D-F40FEFB1B941}"/>
+              </a:ext>
+            </a:extLst>
+          </p:cNvPr>
+          <p:cNvSpPr/>
+          <p:nvPr/>
+        </p:nvSpPr>
+        <p:spPr>
+          <a:xfrm>
+            <a:off x="2964603" y="4411293"/>
+            <a:ext cx="763351" cy="369332"/>
+          </a:xfrm>
+          <a:prstGeom prst="rect">
+            <a:avLst/>
+          </a:prstGeom>
+        </p:spPr>
+        <p:txBody>
+          <a:bodyPr wrap="none">
+            <a:spAutoFit/>
+          </a:bodyPr>
+          <a:lstStyle/>
+          <a:p>
+            <a:r>
+              <a:rPr lang="en-GB" b="1" dirty="0"/>
+              <a:t>Males</a:t>
+            </a:r>
+          </a:p>
+        </p:txBody>
+      </p:sp>
+      <p:sp>
+        <p:nvSpPr>
+          <p:cNvPr id="19" name="Rectangle 18">
+            <a:extLst>
+              <a:ext uri="{FF2B5EF4-FFF2-40B4-BE49-F238E27FC236}">
+                <a16:creationId xmlns:a16="http://schemas.microsoft.com/office/drawing/2014/main" id="{A5D2A5C3-3E72-1E40-A589-2B91FE38E397}"/>
+              </a:ext>
+            </a:extLst>
+          </p:cNvPr>
+          <p:cNvSpPr/>
+          <p:nvPr/>
+        </p:nvSpPr>
+        <p:spPr>
+          <a:xfrm>
+            <a:off x="4848676" y="4394470"/>
+            <a:ext cx="966740" cy="369332"/>
+          </a:xfrm>
+          <a:prstGeom prst="rect">
+            <a:avLst/>
+          </a:prstGeom>
+        </p:spPr>
+        <p:txBody>
+          <a:bodyPr wrap="none">
+            <a:spAutoFit/>
+          </a:bodyPr>
+          <a:lstStyle/>
+          <a:p>
+            <a:r>
+              <a:rPr lang="en-GB" b="1" dirty="0"/>
+              <a:t>Females</a:t>
+            </a:r>
+          </a:p>
+        </p:txBody>
+      </p:sp>
+      <p:pic>
+        <p:nvPicPr>
+          <p:cNvPr id="20" name="Picture 19">
+            <a:extLst>
+              <a:ext uri="{FF2B5EF4-FFF2-40B4-BE49-F238E27FC236}">
+                <a16:creationId xmlns:a16="http://schemas.microsoft.com/office/drawing/2014/main" id="{DB7D6199-C331-954C-B2B1-741AC63BB605}"/>
+              </a:ext>
+            </a:extLst>
+          </p:cNvPr>
+          <p:cNvPicPr>
+            <a:picLocks noChangeAspect="1"/>
+          </p:cNvPicPr>
+          <p:nvPr/>
+        </p:nvPicPr>
+        <p:blipFill>
+          <a:blip r:embed="rId6"/>
+          <a:stretch>
+            <a:fillRect/>
+          </a:stretch>
+        </p:blipFill>
+        <p:spPr>
+          <a:xfrm>
+            <a:off x="4010432" y="5498705"/>
+            <a:ext cx="567267" cy="567267"/>
+          </a:xfrm>
+          <a:prstGeom prst="rect">
+            <a:avLst/>
+          </a:prstGeom>
+        </p:spPr>
+      </p:pic>
+      <p:sp>
+        <p:nvSpPr>
+          <p:cNvPr id="21" name="Rectangle 20">
+            <a:extLst>
+              <a:ext uri="{FF2B5EF4-FFF2-40B4-BE49-F238E27FC236}">
+                <a16:creationId xmlns:a16="http://schemas.microsoft.com/office/drawing/2014/main" id="{1EFE4D64-2956-7345-93E8-EC9C1882A002}"/>
+              </a:ext>
+            </a:extLst>
+          </p:cNvPr>
+          <p:cNvSpPr/>
+          <p:nvPr/>
+        </p:nvSpPr>
+        <p:spPr>
+          <a:xfrm>
+            <a:off x="352052" y="5086967"/>
+            <a:ext cx="1701370" cy="861774"/>
+          </a:xfrm>
+          <a:prstGeom prst="rect">
+            <a:avLst/>
+          </a:prstGeom>
+        </p:spPr>
+        <p:txBody>
+          <a:bodyPr wrap="square">
+            <a:spAutoFit/>
+          </a:bodyPr>
+          <a:lstStyle/>
+          <a:p>
+            <a:r>
+              <a:rPr lang="en-GB" sz="1000" dirty="0">
+                <a:solidFill>
+                  <a:srgbClr val="13171D"/>
+                </a:solidFill>
+                <a:latin typeface="Calibri" panose="020F0502020204030204" pitchFamily="34" charset="0"/>
+                <a:cs typeface="Calibri" panose="020F0502020204030204" pitchFamily="34" charset="0"/>
+              </a:rPr>
+              <a:t>Age standardised rates of mortality per 100,000 are significantly higher among males compared to females for all ethnic groups.</a:t>
+            </a:r>
+            <a:endParaRPr lang="en-US" sz="1000" dirty="0">
+              <a:latin typeface="Calibri" panose="020F0502020204030204" pitchFamily="34" charset="0"/>
+              <a:cs typeface="Calibri" panose="020F0502020204030204" pitchFamily="34" charset="0"/>
+            </a:endParaRPr>
+          </a:p>
+        </p:txBody>
+      </p:sp>
+      <p:sp>
+        <p:nvSpPr>
+          <p:cNvPr id="22" name="Rectangle 21">
+            <a:extLst>
+              <a:ext uri="{FF2B5EF4-FFF2-40B4-BE49-F238E27FC236}">
+                <a16:creationId xmlns:a16="http://schemas.microsoft.com/office/drawing/2014/main" id="{CBA98488-7B03-3C4A-B10A-9C48F3D385F8}"/>
+              </a:ext>
+            </a:extLst>
+          </p:cNvPr>
+          <p:cNvSpPr/>
+          <p:nvPr/>
+        </p:nvSpPr>
+        <p:spPr>
+          <a:xfrm>
+            <a:off x="-7608" y="1507501"/>
+            <a:ext cx="1575622" cy="1015663"/>
+          </a:xfrm>
+          <a:prstGeom prst="rect">
+            <a:avLst/>
+          </a:prstGeom>
+        </p:spPr>
+        <p:txBody>
+          <a:bodyPr wrap="square">
+            <a:spAutoFit/>
+          </a:bodyPr>
+          <a:lstStyle/>
+          <a:p>
+            <a:pPr algn="just"/>
+            <a:r>
+              <a:rPr lang="en-GB" sz="1000" dirty="0">
+                <a:latin typeface="Calibri" panose="020F0502020204030204" pitchFamily="34" charset="0"/>
+                <a:cs typeface="Calibri" panose="020F0502020204030204" pitchFamily="34" charset="0"/>
+              </a:rPr>
+              <a:t>The highest diagnosis rates of Covid-19 per 100,000 population were among people of Other ethnic groups (234 for females and 427 for males).</a:t>
+            </a:r>
+          </a:p>
+        </p:txBody>
+      </p:sp>
+      <p:sp>
+        <p:nvSpPr>
+          <p:cNvPr id="23" name="Rectangle 22">
+            <a:extLst>
+              <a:ext uri="{FF2B5EF4-FFF2-40B4-BE49-F238E27FC236}">
+                <a16:creationId xmlns:a16="http://schemas.microsoft.com/office/drawing/2014/main" id="{A1A7962C-4EDB-E04B-AC95-0B252E74FA61}"/>
+              </a:ext>
+            </a:extLst>
+          </p:cNvPr>
+          <p:cNvSpPr/>
+          <p:nvPr/>
+        </p:nvSpPr>
+        <p:spPr>
+          <a:xfrm>
+            <a:off x="6814599" y="675601"/>
+            <a:ext cx="4594410" cy="830997"/>
+          </a:xfrm>
+          <a:prstGeom prst="rect">
+            <a:avLst/>
+          </a:prstGeom>
+        </p:spPr>
+        <p:txBody>
+          <a:bodyPr wrap="square">
+            <a:spAutoFit/>
+          </a:bodyPr>
+          <a:lstStyle/>
+          <a:p>
+            <a:pPr algn="just"/>
+            <a:r>
+              <a:rPr lang="en-GB" sz="1200" dirty="0">
+                <a:latin typeface="Calibri" panose="020F0502020204030204" pitchFamily="34" charset="0"/>
+                <a:cs typeface="Calibri" panose="020F0502020204030204" pitchFamily="34" charset="0"/>
+              </a:rPr>
+              <a:t>A survival analysis comparing people with confirmed Covid-19 by sex, age group, ethnicity, deprivation and region, shows that, after taking these factors into account, some ethnic groups still had a higher risk of death than others.</a:t>
+            </a:r>
+          </a:p>
+        </p:txBody>
+      </p:sp>
+      <p:sp>
+        <p:nvSpPr>
+          <p:cNvPr id="24" name="Rectangle 23">
+            <a:extLst>
+              <a:ext uri="{FF2B5EF4-FFF2-40B4-BE49-F238E27FC236}">
+                <a16:creationId xmlns:a16="http://schemas.microsoft.com/office/drawing/2014/main" id="{9BD3241C-1955-134C-9687-413B70230236}"/>
+              </a:ext>
+            </a:extLst>
+          </p:cNvPr>
+          <p:cNvSpPr/>
+          <p:nvPr/>
+        </p:nvSpPr>
+        <p:spPr>
+          <a:xfrm>
+            <a:off x="7123879" y="1889074"/>
+            <a:ext cx="4285130" cy="830997"/>
+          </a:xfrm>
+          <a:prstGeom prst="rect">
+            <a:avLst/>
+          </a:prstGeom>
+        </p:spPr>
+        <p:txBody>
+          <a:bodyPr wrap="square">
+            <a:spAutoFit/>
+          </a:bodyPr>
+          <a:lstStyle/>
+          <a:p>
+            <a:r>
+              <a:rPr lang="en-GB" sz="1200" dirty="0">
+                <a:latin typeface="Calibri" panose="020F0502020204030204" pitchFamily="34" charset="0"/>
+                <a:cs typeface="Calibri" panose="020F0502020204030204" pitchFamily="34" charset="0"/>
+              </a:rPr>
+              <a:t>…people of Bangladeshi ethnicity had twice the risk of death. </a:t>
+            </a:r>
+          </a:p>
+          <a:p>
+            <a:r>
+              <a:rPr lang="en-GB" sz="1200" dirty="0">
+                <a:latin typeface="Calibri" panose="020F0502020204030204" pitchFamily="34" charset="0"/>
+                <a:cs typeface="Calibri" panose="020F0502020204030204" pitchFamily="34" charset="0"/>
+              </a:rPr>
+              <a:t>…People of Chinese, Indian, Pakistani, Other Asian, Caribbean and Other Black ethnicity had between 10 and 50% higher risk of death when compared to White British </a:t>
+            </a:r>
+          </a:p>
+        </p:txBody>
+      </p:sp>
+      <p:sp>
+        <p:nvSpPr>
+          <p:cNvPr id="25" name="Rectangle 24">
+            <a:extLst>
+              <a:ext uri="{FF2B5EF4-FFF2-40B4-BE49-F238E27FC236}">
+                <a16:creationId xmlns:a16="http://schemas.microsoft.com/office/drawing/2014/main" id="{849C41D4-D035-F24B-AEB3-D5A5915ECE55}"/>
+              </a:ext>
+            </a:extLst>
+          </p:cNvPr>
+          <p:cNvSpPr/>
+          <p:nvPr/>
+        </p:nvSpPr>
+        <p:spPr>
+          <a:xfrm>
+            <a:off x="6693575" y="1686324"/>
+            <a:ext cx="3612775" cy="276999"/>
+          </a:xfrm>
+          <a:prstGeom prst="rect">
+            <a:avLst/>
+          </a:prstGeom>
+        </p:spPr>
+        <p:txBody>
+          <a:bodyPr wrap="square">
+            <a:spAutoFit/>
+          </a:bodyPr>
+          <a:lstStyle/>
+          <a:p>
+            <a:r>
+              <a:rPr lang="en-GB" sz="1200" b="1" dirty="0">
+                <a:latin typeface="Calibri" panose="020F0502020204030204" pitchFamily="34" charset="0"/>
+                <a:cs typeface="Calibri" panose="020F0502020204030204" pitchFamily="34" charset="0"/>
+              </a:rPr>
+              <a:t>Compared to people from White British groups…</a:t>
+            </a:r>
+          </a:p>
+        </p:txBody>
+      </p:sp>
+      <p:sp>
+        <p:nvSpPr>
+          <p:cNvPr id="27" name="Rectangle 26">
+            <a:extLst>
+              <a:ext uri="{FF2B5EF4-FFF2-40B4-BE49-F238E27FC236}">
+                <a16:creationId xmlns:a16="http://schemas.microsoft.com/office/drawing/2014/main" id="{7C3101E2-959A-D94D-A8B6-7A6654BEBC0F}"/>
+              </a:ext>
+            </a:extLst>
+          </p:cNvPr>
+          <p:cNvSpPr/>
+          <p:nvPr/>
+        </p:nvSpPr>
+        <p:spPr>
+          <a:xfrm>
+            <a:off x="7123879" y="3114630"/>
+            <a:ext cx="4715436" cy="830997"/>
+          </a:xfrm>
+          <a:prstGeom prst="rect">
+            <a:avLst/>
+          </a:prstGeom>
+        </p:spPr>
+        <p:txBody>
+          <a:bodyPr wrap="square">
+            <a:spAutoFit/>
+          </a:bodyPr>
+          <a:lstStyle/>
+          <a:p>
+            <a:r>
+              <a:rPr lang="en-GB" sz="1200" dirty="0">
+                <a:latin typeface="Calibri" panose="020F0502020204030204" pitchFamily="34" charset="0"/>
+                <a:cs typeface="Calibri" panose="020F0502020204030204" pitchFamily="34" charset="0"/>
+              </a:rPr>
+              <a:t>...risk of death 80% higher among people of Bangladeshi ethnicity</a:t>
+            </a:r>
+          </a:p>
+          <a:p>
+            <a:r>
+              <a:rPr lang="en-GB" sz="1200" dirty="0">
+                <a:latin typeface="Calibri" panose="020F0502020204030204" pitchFamily="34" charset="0"/>
+                <a:cs typeface="Calibri" panose="020F0502020204030204" pitchFamily="34" charset="0"/>
+              </a:rPr>
+              <a:t>…50% higher among Black Other ethnicity and Pakistani ethnicity groups</a:t>
+            </a:r>
+          </a:p>
+          <a:p>
+            <a:r>
+              <a:rPr lang="en-GB" sz="1200" dirty="0">
+                <a:latin typeface="Calibri" panose="020F0502020204030204" pitchFamily="34" charset="0"/>
+                <a:cs typeface="Calibri" panose="020F0502020204030204" pitchFamily="34" charset="0"/>
+              </a:rPr>
+              <a:t>…people from Black Caribbean ethnicity groups were 30% more likely to die with Covid-19</a:t>
+            </a:r>
+          </a:p>
+        </p:txBody>
+      </p:sp>
+      <p:sp>
+        <p:nvSpPr>
+          <p:cNvPr id="28" name="Rectangle 27">
+            <a:extLst>
+              <a:ext uri="{FF2B5EF4-FFF2-40B4-BE49-F238E27FC236}">
+                <a16:creationId xmlns:a16="http://schemas.microsoft.com/office/drawing/2014/main" id="{8F31C140-860E-4F45-973B-38B39581CDBA}"/>
+              </a:ext>
+            </a:extLst>
+          </p:cNvPr>
+          <p:cNvSpPr/>
+          <p:nvPr/>
+        </p:nvSpPr>
+        <p:spPr>
+          <a:xfrm>
+            <a:off x="6693575" y="2890762"/>
+            <a:ext cx="5683623" cy="276999"/>
+          </a:xfrm>
+          <a:prstGeom prst="rect">
+            <a:avLst/>
+          </a:prstGeom>
+        </p:spPr>
+        <p:txBody>
+          <a:bodyPr wrap="square">
+            <a:spAutoFit/>
+          </a:bodyPr>
+          <a:lstStyle/>
+          <a:p>
+            <a:r>
+              <a:rPr lang="en-GB" sz="1200" b="1" dirty="0">
+                <a:latin typeface="Calibri" panose="020F0502020204030204" pitchFamily="34" charset="0"/>
+                <a:cs typeface="Calibri" panose="020F0502020204030204" pitchFamily="34" charset="0"/>
+              </a:rPr>
+              <a:t>Compared to working age (20-64 years) people from White British groups…</a:t>
+            </a:r>
+          </a:p>
+        </p:txBody>
+      </p:sp>
+      <p:sp>
+        <p:nvSpPr>
+          <p:cNvPr id="29" name="Rectangle 28">
+            <a:extLst>
+              <a:ext uri="{FF2B5EF4-FFF2-40B4-BE49-F238E27FC236}">
+                <a16:creationId xmlns:a16="http://schemas.microsoft.com/office/drawing/2014/main" id="{7F6A78CC-A9EF-EC4C-98E3-44749D3AFB51}"/>
+              </a:ext>
+            </a:extLst>
+          </p:cNvPr>
+          <p:cNvSpPr/>
+          <p:nvPr/>
+        </p:nvSpPr>
+        <p:spPr>
+          <a:xfrm>
+            <a:off x="6830761" y="4247503"/>
+            <a:ext cx="5077085" cy="430887"/>
+          </a:xfrm>
+          <a:prstGeom prst="rect">
+            <a:avLst/>
+          </a:prstGeom>
+        </p:spPr>
+        <p:txBody>
+          <a:bodyPr wrap="square">
+            <a:spAutoFit/>
+          </a:bodyPr>
+          <a:lstStyle/>
+          <a:p>
+            <a:r>
+              <a:rPr lang="en-GB" sz="1100" dirty="0">
+                <a:latin typeface="Calibri" panose="020F0502020204030204" pitchFamily="34" charset="0"/>
+                <a:cs typeface="Calibri" panose="020F0502020204030204" pitchFamily="34" charset="0"/>
+              </a:rPr>
+              <a:t>Deaths by sex and ethnic group in the period 20 March to 7 May compared to corresponding dates in 2014 to 2018 model based on ONS mortality registrations.</a:t>
+            </a:r>
+          </a:p>
+        </p:txBody>
+      </p:sp>
+      <p:sp>
+        <p:nvSpPr>
+          <p:cNvPr id="30" name="Rectangle 29">
+            <a:extLst>
+              <a:ext uri="{FF2B5EF4-FFF2-40B4-BE49-F238E27FC236}">
+                <a16:creationId xmlns:a16="http://schemas.microsoft.com/office/drawing/2014/main" id="{B71FD30C-34CA-8148-93A7-CC97D92AE3F1}"/>
+              </a:ext>
+            </a:extLst>
+          </p:cNvPr>
+          <p:cNvSpPr/>
+          <p:nvPr/>
+        </p:nvSpPr>
+        <p:spPr>
+          <a:xfrm>
+            <a:off x="6427067" y="4025147"/>
+            <a:ext cx="5280839" cy="307777"/>
+          </a:xfrm>
+          <a:prstGeom prst="rect">
+            <a:avLst/>
+          </a:prstGeom>
+        </p:spPr>
+        <p:txBody>
+          <a:bodyPr wrap="square">
+            <a:spAutoFit/>
+          </a:bodyPr>
+          <a:lstStyle/>
+          <a:p>
+            <a:r>
+              <a:rPr lang="en-GB" sz="1400" b="1" dirty="0">
+                <a:latin typeface="Calibri" panose="020F0502020204030204" pitchFamily="34" charset="0"/>
+                <a:cs typeface="Calibri" panose="020F0502020204030204" pitchFamily="34" charset="0"/>
+              </a:rPr>
+              <a:t>Excess deaths (includes deaths without Covid-19 diagnoses)</a:t>
+            </a:r>
+          </a:p>
+        </p:txBody>
+      </p:sp>
+      <p:graphicFrame>
+        <p:nvGraphicFramePr>
+          <p:cNvPr id="34" name="Table 33">
+            <a:extLst>
+              <a:ext uri="{FF2B5EF4-FFF2-40B4-BE49-F238E27FC236}">
+                <a16:creationId xmlns:a16="http://schemas.microsoft.com/office/drawing/2014/main" id="{105C0926-6BC5-9548-B785-FFC8643C0CEB}"/>
+              </a:ext>
+            </a:extLst>
+          </p:cNvPr>
+          <p:cNvGraphicFramePr>
+            <a:graphicFrameLocks noGrp="1"/>
+          </p:cNvGraphicFramePr>
+          <p:nvPr>
+            <p:extLst>
+              <p:ext uri="{D42A27DB-BD31-4B8C-83A1-F6EECF244321}">
+                <p14:modId xmlns:p14="http://schemas.microsoft.com/office/powerpoint/2010/main" val="3752558530"/>
+              </p:ext>
+            </p:extLst>
+          </p:nvPr>
+        </p:nvGraphicFramePr>
+        <p:xfrm>
+          <a:off x="7203488" y="4725853"/>
+          <a:ext cx="4367232" cy="1297305"/>
+        </p:xfrm>
+        <a:graphic>
+          <a:graphicData uri="http://schemas.openxmlformats.org/drawingml/2006/table">
+            <a:tbl>
+              <a:tblPr>
+                <a:tableStyleId>{2D5ABB26-0587-4C30-8999-92F81FD0307C}</a:tableStyleId>
+              </a:tblPr>
+              <a:tblGrid>
+                <a:gridCol w="803842">
+                  <a:extLst>
+                    <a:ext uri="{9D8B030D-6E8A-4147-A177-3AD203B41FA5}">
+                      <a16:colId xmlns:a16="http://schemas.microsoft.com/office/drawing/2014/main" val="1654749730"/>
+                    </a:ext>
+                  </a:extLst>
+                </a:gridCol>
+                <a:gridCol w="803842">
+                  <a:extLst>
+                    <a:ext uri="{9D8B030D-6E8A-4147-A177-3AD203B41FA5}">
+                      <a16:colId xmlns:a16="http://schemas.microsoft.com/office/drawing/2014/main" val="3950298568"/>
+                    </a:ext>
+                  </a:extLst>
+                </a:gridCol>
+                <a:gridCol w="1379774">
+                  <a:extLst>
+                    <a:ext uri="{9D8B030D-6E8A-4147-A177-3AD203B41FA5}">
+                      <a16:colId xmlns:a16="http://schemas.microsoft.com/office/drawing/2014/main" val="1143461622"/>
+                    </a:ext>
+                  </a:extLst>
+                </a:gridCol>
+                <a:gridCol w="1379774">
+                  <a:extLst>
+                    <a:ext uri="{9D8B030D-6E8A-4147-A177-3AD203B41FA5}">
+                      <a16:colId xmlns:a16="http://schemas.microsoft.com/office/drawing/2014/main" val="1422976812"/>
+                    </a:ext>
+                  </a:extLst>
+                </a:gridCol>
+              </a:tblGrid>
+              <a:tr h="340976">
+                <a:tc>
+                  <a:txBody>
+                    <a:bodyPr/>
+                    <a:lstStyle/>
+                    <a:p>
+                      <a:pPr algn="l" fontAlgn="t"/>
+                      <a:r>
+                        <a:rPr lang="en-GB" sz="1100" b="1" u="none" strike="noStrike" dirty="0">
+                          <a:effectLst/>
+                        </a:rPr>
+                        <a:t>Ethnicity</a:t>
+                      </a:r>
+                      <a:endParaRPr lang="en-GB" sz="1100" b="1" i="0" u="none" strike="noStrike" dirty="0">
+                        <a:solidFill>
+                          <a:srgbClr val="000000"/>
+                        </a:solidFill>
+                        <a:effectLst/>
+                        <a:latin typeface="Calibri" panose="020F0502020204030204" pitchFamily="34" charset="0"/>
+                      </a:endParaRPr>
+                    </a:p>
+                  </a:txBody>
+                  <a:tcPr marL="9525" marR="9525" marT="9525" marB="0">
+                    <a:lnT w="12700" cap="flat" cmpd="sng" algn="ctr">
+                      <a:solidFill>
+                        <a:schemeClr val="tx1"/>
+                      </a:solidFill>
+                      <a:prstDash val="solid"/>
+                      <a:round/>
+                      <a:headEnd type="none" w="med" len="med"/>
+                      <a:tailEnd type="none" w="med" len="med"/>
+                    </a:lnT>
+                    <a:lnB w="12700" cap="flat" cmpd="sng" algn="ctr">
+                      <a:solidFill>
+                        <a:schemeClr val="tx1"/>
+                      </a:solidFill>
+                      <a:prstDash val="solid"/>
+                      <a:round/>
+                      <a:headEnd type="none" w="med" len="med"/>
+                      <a:tailEnd type="none" w="med" len="med"/>
+                    </a:lnB>
+                  </a:tcPr>
+                </a:tc>
+                <a:tc>
+                  <a:txBody>
+                    <a:bodyPr/>
+                    <a:lstStyle/>
+                    <a:p>
+                      <a:pPr algn="r" fontAlgn="b"/>
+                      <a:r>
+                        <a:rPr lang="en-GB" sz="1100" b="1" u="none" strike="noStrike" dirty="0">
+                          <a:effectLst/>
+                        </a:rPr>
+                        <a:t>Total excess deaths</a:t>
+                      </a:r>
+                      <a:endParaRPr lang="en-GB" sz="1100" b="1" i="0" u="none" strike="noStrike" dirty="0">
+                        <a:solidFill>
+                          <a:srgbClr val="000000"/>
+                        </a:solidFill>
+                        <a:effectLst/>
+                        <a:latin typeface="Calibri" panose="020F0502020204030204" pitchFamily="34" charset="0"/>
+                      </a:endParaRPr>
+                    </a:p>
+                  </a:txBody>
+                  <a:tcPr marL="9525" marR="9525" marT="9525" marB="0" anchor="b">
+                    <a:lnT w="12700" cap="flat" cmpd="sng" algn="ctr">
+                      <a:solidFill>
+                        <a:schemeClr val="tx1"/>
+                      </a:solidFill>
+                      <a:prstDash val="solid"/>
+                      <a:round/>
+                      <a:headEnd type="none" w="med" len="med"/>
+                      <a:tailEnd type="none" w="med" len="med"/>
+                    </a:lnT>
+                    <a:lnB w="12700" cap="flat" cmpd="sng" algn="ctr">
+                      <a:solidFill>
+                        <a:schemeClr val="tx1"/>
+                      </a:solidFill>
+                      <a:prstDash val="solid"/>
+                      <a:round/>
+                      <a:headEnd type="none" w="med" len="med"/>
+                      <a:tailEnd type="none" w="med" len="med"/>
+                    </a:lnB>
+                  </a:tcPr>
+                </a:tc>
+                <a:tc>
+                  <a:txBody>
+                    <a:bodyPr/>
+                    <a:lstStyle/>
+                    <a:p>
+                      <a:pPr algn="r" fontAlgn="b"/>
+                      <a:r>
+                        <a:rPr lang="en-GB" sz="1100" b="1" u="none" strike="noStrike" dirty="0">
+                          <a:effectLst/>
+                        </a:rPr>
+                        <a:t>Male excess deaths compared to 2014-18</a:t>
+                      </a:r>
+                      <a:endParaRPr lang="en-GB" sz="1100" b="1" i="0" u="none" strike="noStrike" dirty="0">
+                        <a:solidFill>
+                          <a:srgbClr val="000000"/>
+                        </a:solidFill>
+                        <a:effectLst/>
+                        <a:latin typeface="Calibri" panose="020F0502020204030204" pitchFamily="34" charset="0"/>
+                      </a:endParaRPr>
+                    </a:p>
+                  </a:txBody>
+                  <a:tcPr marL="9525" marR="9525" marT="9525" marB="0" anchor="b">
+                    <a:lnT w="12700" cap="flat" cmpd="sng" algn="ctr">
+                      <a:solidFill>
+                        <a:schemeClr val="tx1"/>
+                      </a:solidFill>
+                      <a:prstDash val="solid"/>
+                      <a:round/>
+                      <a:headEnd type="none" w="med" len="med"/>
+                      <a:tailEnd type="none" w="med" len="med"/>
+                    </a:lnT>
+                    <a:lnB w="12700" cap="flat" cmpd="sng" algn="ctr">
+                      <a:solidFill>
+                        <a:schemeClr val="tx1"/>
+                      </a:solidFill>
+                      <a:prstDash val="solid"/>
+                      <a:round/>
+                      <a:headEnd type="none" w="med" len="med"/>
+                      <a:tailEnd type="none" w="med" len="med"/>
+                    </a:lnB>
+                  </a:tcPr>
+                </a:tc>
+                <a:tc>
+                  <a:txBody>
+                    <a:bodyPr/>
+                    <a:lstStyle/>
+                    <a:p>
+                      <a:pPr algn="r" fontAlgn="b"/>
+                      <a:r>
+                        <a:rPr lang="en-GB" sz="1100" b="1" u="none" strike="noStrike" dirty="0">
+                          <a:effectLst/>
+                        </a:rPr>
+                        <a:t>Female excess deaths compared to 2014-18</a:t>
+                      </a:r>
+                      <a:endParaRPr lang="en-GB" sz="1100" b="1" i="0" u="none" strike="noStrike" dirty="0">
+                        <a:solidFill>
+                          <a:srgbClr val="000000"/>
+                        </a:solidFill>
+                        <a:effectLst/>
+                        <a:latin typeface="Calibri" panose="020F0502020204030204" pitchFamily="34" charset="0"/>
+                      </a:endParaRPr>
+                    </a:p>
+                  </a:txBody>
+                  <a:tcPr marL="9525" marR="9525" marT="9525" marB="0" anchor="b">
+                    <a:lnT w="12700" cap="flat" cmpd="sng" algn="ctr">
+                      <a:solidFill>
+                        <a:schemeClr val="tx1"/>
+                      </a:solidFill>
+                      <a:prstDash val="solid"/>
+                      <a:round/>
+                      <a:headEnd type="none" w="med" len="med"/>
+                      <a:tailEnd type="none" w="med" len="med"/>
+                    </a:lnT>
+                    <a:lnB w="12700" cap="flat" cmpd="sng" algn="ctr">
+                      <a:solidFill>
+                        <a:schemeClr val="tx1"/>
+                      </a:solidFill>
+                      <a:prstDash val="solid"/>
+                      <a:round/>
+                      <a:headEnd type="none" w="med" len="med"/>
+                      <a:tailEnd type="none" w="med" len="med"/>
+                    </a:lnB>
+                  </a:tcPr>
+                </a:tc>
+                <a:extLst>
+                  <a:ext uri="{0D108BD9-81ED-4DB2-BD59-A6C34878D82A}">
+                    <a16:rowId xmlns:a16="http://schemas.microsoft.com/office/drawing/2014/main" val="1633545485"/>
+                  </a:ext>
+                </a:extLst>
+              </a:tr>
+              <a:tr h="190500">
+                <a:tc>
+                  <a:txBody>
+                    <a:bodyPr/>
+                    <a:lstStyle/>
+                    <a:p>
+                      <a:pPr algn="l" fontAlgn="b"/>
+                      <a:r>
+                        <a:rPr lang="en-GB" sz="1100" u="none" strike="noStrike">
+                          <a:effectLst/>
+                        </a:rPr>
+                        <a:t>White</a:t>
+                      </a:r>
+                      <a:endParaRPr lang="en-GB" sz="1100" b="0" i="0" u="none" strike="noStrike">
+                        <a:solidFill>
+                          <a:srgbClr val="000000"/>
+                        </a:solidFill>
+                        <a:effectLst/>
+                        <a:latin typeface="Calibri" panose="020F0502020204030204" pitchFamily="34" charset="0"/>
+                      </a:endParaRPr>
+                    </a:p>
+                  </a:txBody>
+                  <a:tcPr marL="9525" marR="9525" marT="9525" marB="0" anchor="b">
+                    <a:lnT w="12700" cap="flat" cmpd="sng" algn="ctr">
+                      <a:solidFill>
+                        <a:schemeClr val="tx1"/>
+                      </a:solidFill>
+                      <a:prstDash val="solid"/>
+                      <a:round/>
+                      <a:headEnd type="none" w="med" len="med"/>
+                      <a:tailEnd type="none" w="med" len="med"/>
+                    </a:lnT>
+                  </a:tcPr>
+                </a:tc>
+                <a:tc>
+                  <a:txBody>
+                    <a:bodyPr/>
+                    <a:lstStyle/>
+                    <a:p>
+                      <a:pPr algn="r" fontAlgn="b"/>
+                      <a:r>
+                        <a:rPr lang="en-GB" sz="1100" u="none" strike="noStrike">
+                          <a:effectLst/>
+                        </a:rPr>
+                        <a:t>43,941</a:t>
+                      </a:r>
+                      <a:endParaRPr lang="en-GB" sz="1100" b="0" i="0" u="none" strike="noStrike">
+                        <a:solidFill>
+                          <a:srgbClr val="000000"/>
+                        </a:solidFill>
+                        <a:effectLst/>
+                        <a:latin typeface="Calibri" panose="020F0502020204030204" pitchFamily="34" charset="0"/>
+                      </a:endParaRPr>
+                    </a:p>
+                  </a:txBody>
+                  <a:tcPr marL="9525" marR="9525" marT="9525" marB="0" anchor="b">
+                    <a:lnT w="12700" cap="flat" cmpd="sng" algn="ctr">
+                      <a:solidFill>
+                        <a:schemeClr val="tx1"/>
+                      </a:solidFill>
+                      <a:prstDash val="solid"/>
+                      <a:round/>
+                      <a:headEnd type="none" w="med" len="med"/>
+                      <a:tailEnd type="none" w="med" len="med"/>
+                    </a:lnT>
+                  </a:tcPr>
+                </a:tc>
+                <a:tc>
+                  <a:txBody>
+                    <a:bodyPr/>
+                    <a:lstStyle/>
+                    <a:p>
+                      <a:pPr algn="r" fontAlgn="b"/>
+                      <a:r>
+                        <a:rPr lang="en-GB" sz="1100" u="none" strike="noStrike">
+                          <a:effectLst/>
+                        </a:rPr>
+                        <a:t>1.7x</a:t>
+                      </a:r>
+                      <a:endParaRPr lang="en-GB" sz="1100" b="0" i="0" u="none" strike="noStrike">
+                        <a:solidFill>
+                          <a:srgbClr val="000000"/>
+                        </a:solidFill>
+                        <a:effectLst/>
+                        <a:latin typeface="Calibri" panose="020F0502020204030204" pitchFamily="34" charset="0"/>
+                      </a:endParaRPr>
+                    </a:p>
+                  </a:txBody>
+                  <a:tcPr marL="9525" marR="9525" marT="9525" marB="0" anchor="b">
+                    <a:lnT w="12700" cap="flat" cmpd="sng" algn="ctr">
+                      <a:solidFill>
+                        <a:schemeClr val="tx1"/>
+                      </a:solidFill>
+                      <a:prstDash val="solid"/>
+                      <a:round/>
+                      <a:headEnd type="none" w="med" len="med"/>
+                      <a:tailEnd type="none" w="med" len="med"/>
+                    </a:lnT>
+                  </a:tcPr>
+                </a:tc>
+                <a:tc>
+                  <a:txBody>
+                    <a:bodyPr/>
+                    <a:lstStyle/>
+                    <a:p>
+                      <a:pPr algn="r" fontAlgn="b"/>
+                      <a:r>
+                        <a:rPr lang="en-GB" sz="1100" u="none" strike="noStrike">
+                          <a:effectLst/>
+                        </a:rPr>
+                        <a:t>1.6x</a:t>
+                      </a:r>
+                      <a:endParaRPr lang="en-GB" sz="1100" b="0" i="0" u="none" strike="noStrike">
+                        <a:solidFill>
+                          <a:srgbClr val="000000"/>
+                        </a:solidFill>
+                        <a:effectLst/>
+                        <a:latin typeface="Calibri" panose="020F0502020204030204" pitchFamily="34" charset="0"/>
+                      </a:endParaRPr>
+                    </a:p>
+                  </a:txBody>
+                  <a:tcPr marL="9525" marR="9525" marT="9525" marB="0" anchor="b">
+                    <a:lnT w="12700" cap="flat" cmpd="sng" algn="ctr">
+                      <a:solidFill>
+                        <a:schemeClr val="tx1"/>
+                      </a:solidFill>
+                      <a:prstDash val="solid"/>
+                      <a:round/>
+                      <a:headEnd type="none" w="med" len="med"/>
+                      <a:tailEnd type="none" w="med" len="med"/>
+                    </a:lnT>
+                  </a:tcPr>
+                </a:tc>
+                <a:extLst>
+                  <a:ext uri="{0D108BD9-81ED-4DB2-BD59-A6C34878D82A}">
+                    <a16:rowId xmlns:a16="http://schemas.microsoft.com/office/drawing/2014/main" val="229951247"/>
+                  </a:ext>
+                </a:extLst>
+              </a:tr>
+              <a:tr h="190500">
+                <a:tc>
+                  <a:txBody>
+                    <a:bodyPr/>
+                    <a:lstStyle/>
+                    <a:p>
+                      <a:pPr algn="l" fontAlgn="b"/>
+                      <a:r>
+                        <a:rPr lang="en-GB" sz="1100" u="none" strike="noStrike" dirty="0">
+                          <a:effectLst/>
+                        </a:rPr>
+                        <a:t>Black</a:t>
+                      </a:r>
+                      <a:endParaRPr lang="en-GB" sz="1100" b="0" i="0" u="none" strike="noStrike" dirty="0">
+                        <a:solidFill>
+                          <a:srgbClr val="000000"/>
+                        </a:solidFill>
+                        <a:effectLst/>
+                        <a:latin typeface="Calibri" panose="020F0502020204030204" pitchFamily="34" charset="0"/>
+                      </a:endParaRPr>
+                    </a:p>
+                  </a:txBody>
+                  <a:tcPr marL="9525" marR="9525" marT="9525" marB="0" anchor="b"/>
+                </a:tc>
+                <a:tc>
+                  <a:txBody>
+                    <a:bodyPr/>
+                    <a:lstStyle/>
+                    <a:p>
+                      <a:pPr algn="r" fontAlgn="b"/>
+                      <a:r>
+                        <a:rPr lang="en-GB" sz="1100" u="none" strike="noStrike">
+                          <a:effectLst/>
+                        </a:rPr>
+                        <a:t>2,301</a:t>
+                      </a:r>
+                      <a:endParaRPr lang="en-GB" sz="1100" b="0" i="0" u="none" strike="noStrike">
+                        <a:solidFill>
+                          <a:srgbClr val="000000"/>
+                        </a:solidFill>
+                        <a:effectLst/>
+                        <a:latin typeface="Calibri" panose="020F0502020204030204" pitchFamily="34" charset="0"/>
+                      </a:endParaRPr>
+                    </a:p>
+                  </a:txBody>
+                  <a:tcPr marL="9525" marR="9525" marT="9525" marB="0" anchor="b"/>
+                </a:tc>
+                <a:tc>
+                  <a:txBody>
+                    <a:bodyPr/>
+                    <a:lstStyle/>
+                    <a:p>
+                      <a:pPr algn="r" fontAlgn="b"/>
+                      <a:r>
+                        <a:rPr lang="en-GB" sz="1100" u="none" strike="noStrike">
+                          <a:effectLst/>
+                        </a:rPr>
+                        <a:t>3.9x</a:t>
+                      </a:r>
+                      <a:endParaRPr lang="en-GB" sz="1100" b="0" i="0" u="none" strike="noStrike">
+                        <a:solidFill>
+                          <a:srgbClr val="000000"/>
+                        </a:solidFill>
+                        <a:effectLst/>
+                        <a:latin typeface="Calibri" panose="020F0502020204030204" pitchFamily="34" charset="0"/>
+                      </a:endParaRPr>
+                    </a:p>
+                  </a:txBody>
+                  <a:tcPr marL="9525" marR="9525" marT="9525" marB="0" anchor="b"/>
+                </a:tc>
+                <a:tc>
+                  <a:txBody>
+                    <a:bodyPr/>
+                    <a:lstStyle/>
+                    <a:p>
+                      <a:pPr algn="r" fontAlgn="b"/>
+                      <a:r>
+                        <a:rPr lang="en-GB" sz="1100" u="none" strike="noStrike">
+                          <a:effectLst/>
+                        </a:rPr>
+                        <a:t>2.8x</a:t>
+                      </a:r>
+                      <a:endParaRPr lang="en-GB" sz="1100" b="0" i="0" u="none" strike="noStrike">
+                        <a:solidFill>
+                          <a:srgbClr val="000000"/>
+                        </a:solidFill>
+                        <a:effectLst/>
+                        <a:latin typeface="Calibri" panose="020F0502020204030204" pitchFamily="34" charset="0"/>
+                      </a:endParaRPr>
+                    </a:p>
+                  </a:txBody>
+                  <a:tcPr marL="9525" marR="9525" marT="9525" marB="0" anchor="b"/>
+                </a:tc>
+                <a:extLst>
+                  <a:ext uri="{0D108BD9-81ED-4DB2-BD59-A6C34878D82A}">
+                    <a16:rowId xmlns:a16="http://schemas.microsoft.com/office/drawing/2014/main" val="247321819"/>
+                  </a:ext>
+                </a:extLst>
+              </a:tr>
+              <a:tr h="190500">
+                <a:tc>
+                  <a:txBody>
+                    <a:bodyPr/>
+                    <a:lstStyle/>
+                    <a:p>
+                      <a:pPr algn="l" fontAlgn="b"/>
+                      <a:r>
+                        <a:rPr lang="en-GB" sz="1100" u="none" strike="noStrike">
+                          <a:effectLst/>
+                        </a:rPr>
+                        <a:t>Asian</a:t>
+                      </a:r>
+                      <a:endParaRPr lang="en-GB" sz="1100" b="0" i="0" u="none" strike="noStrike">
+                        <a:solidFill>
+                          <a:srgbClr val="000000"/>
+                        </a:solidFill>
+                        <a:effectLst/>
+                        <a:latin typeface="Calibri" panose="020F0502020204030204" pitchFamily="34" charset="0"/>
+                      </a:endParaRPr>
+                    </a:p>
+                  </a:txBody>
+                  <a:tcPr marL="9525" marR="9525" marT="9525" marB="0" anchor="b"/>
+                </a:tc>
+                <a:tc>
+                  <a:txBody>
+                    <a:bodyPr/>
+                    <a:lstStyle/>
+                    <a:p>
+                      <a:pPr algn="r" fontAlgn="b"/>
+                      <a:r>
+                        <a:rPr lang="en-GB" sz="1100" u="none" strike="noStrike">
+                          <a:effectLst/>
+                        </a:rPr>
+                        <a:t>3,083</a:t>
+                      </a:r>
+                      <a:endParaRPr lang="en-GB" sz="1100" b="0" i="0" u="none" strike="noStrike">
+                        <a:solidFill>
+                          <a:srgbClr val="000000"/>
+                        </a:solidFill>
+                        <a:effectLst/>
+                        <a:latin typeface="Calibri" panose="020F0502020204030204" pitchFamily="34" charset="0"/>
+                      </a:endParaRPr>
+                    </a:p>
+                  </a:txBody>
+                  <a:tcPr marL="9525" marR="9525" marT="9525" marB="0" anchor="b"/>
+                </a:tc>
+                <a:tc>
+                  <a:txBody>
+                    <a:bodyPr/>
+                    <a:lstStyle/>
+                    <a:p>
+                      <a:pPr algn="r" fontAlgn="b"/>
+                      <a:r>
+                        <a:rPr lang="en-GB" sz="1100" u="none" strike="noStrike">
+                          <a:effectLst/>
+                        </a:rPr>
+                        <a:t>2.9x</a:t>
+                      </a:r>
+                      <a:endParaRPr lang="en-GB" sz="1100" b="0" i="0" u="none" strike="noStrike">
+                        <a:solidFill>
+                          <a:srgbClr val="000000"/>
+                        </a:solidFill>
+                        <a:effectLst/>
+                        <a:latin typeface="Calibri" panose="020F0502020204030204" pitchFamily="34" charset="0"/>
+                      </a:endParaRPr>
+                    </a:p>
+                  </a:txBody>
+                  <a:tcPr marL="9525" marR="9525" marT="9525" marB="0" anchor="b"/>
+                </a:tc>
+                <a:tc>
+                  <a:txBody>
+                    <a:bodyPr/>
+                    <a:lstStyle/>
+                    <a:p>
+                      <a:pPr algn="r" fontAlgn="b"/>
+                      <a:r>
+                        <a:rPr lang="en-GB" sz="1100" u="none" strike="noStrike">
+                          <a:effectLst/>
+                        </a:rPr>
+                        <a:t>2.4x</a:t>
+                      </a:r>
+                      <a:endParaRPr lang="en-GB" sz="1100" b="0" i="0" u="none" strike="noStrike">
+                        <a:solidFill>
+                          <a:srgbClr val="000000"/>
+                        </a:solidFill>
+                        <a:effectLst/>
+                        <a:latin typeface="Calibri" panose="020F0502020204030204" pitchFamily="34" charset="0"/>
+                      </a:endParaRPr>
+                    </a:p>
+                  </a:txBody>
+                  <a:tcPr marL="9525" marR="9525" marT="9525" marB="0" anchor="b"/>
+                </a:tc>
+                <a:extLst>
+                  <a:ext uri="{0D108BD9-81ED-4DB2-BD59-A6C34878D82A}">
+                    <a16:rowId xmlns:a16="http://schemas.microsoft.com/office/drawing/2014/main" val="2500161643"/>
+                  </a:ext>
+                </a:extLst>
+              </a:tr>
+              <a:tr h="190500">
+                <a:tc>
+                  <a:txBody>
+                    <a:bodyPr/>
+                    <a:lstStyle/>
+                    <a:p>
+                      <a:pPr algn="l" fontAlgn="b"/>
+                      <a:r>
+                        <a:rPr lang="en-GB" sz="1100" u="none" strike="noStrike">
+                          <a:effectLst/>
+                        </a:rPr>
+                        <a:t>Mixed</a:t>
+                      </a:r>
+                      <a:endParaRPr lang="en-GB" sz="1100" b="0" i="0" u="none" strike="noStrike">
+                        <a:solidFill>
+                          <a:srgbClr val="000000"/>
+                        </a:solidFill>
+                        <a:effectLst/>
+                        <a:latin typeface="Calibri" panose="020F0502020204030204" pitchFamily="34" charset="0"/>
+                      </a:endParaRPr>
+                    </a:p>
+                  </a:txBody>
+                  <a:tcPr marL="9525" marR="9525" marT="9525" marB="0" anchor="b"/>
+                </a:tc>
+                <a:tc>
+                  <a:txBody>
+                    <a:bodyPr/>
+                    <a:lstStyle/>
+                    <a:p>
+                      <a:pPr algn="r" fontAlgn="b"/>
+                      <a:r>
+                        <a:rPr lang="en-GB" sz="1100" u="none" strike="noStrike">
+                          <a:effectLst/>
+                        </a:rPr>
+                        <a:t>385</a:t>
+                      </a:r>
+                      <a:endParaRPr lang="en-GB" sz="1100" b="0" i="0" u="none" strike="noStrike">
+                        <a:solidFill>
+                          <a:srgbClr val="000000"/>
+                        </a:solidFill>
+                        <a:effectLst/>
+                        <a:latin typeface="Calibri" panose="020F0502020204030204" pitchFamily="34" charset="0"/>
+                      </a:endParaRPr>
+                    </a:p>
+                  </a:txBody>
+                  <a:tcPr marL="9525" marR="9525" marT="9525" marB="0" anchor="b"/>
+                </a:tc>
+                <a:tc>
+                  <a:txBody>
+                    <a:bodyPr/>
+                    <a:lstStyle/>
+                    <a:p>
+                      <a:pPr algn="r" fontAlgn="b"/>
+                      <a:r>
+                        <a:rPr lang="en-GB" sz="1100" u="none" strike="noStrike">
+                          <a:effectLst/>
+                        </a:rPr>
+                        <a:t>2.5x</a:t>
+                      </a:r>
+                      <a:endParaRPr lang="en-GB" sz="1100" b="0" i="0" u="none" strike="noStrike">
+                        <a:solidFill>
+                          <a:srgbClr val="000000"/>
+                        </a:solidFill>
+                        <a:effectLst/>
+                        <a:latin typeface="Calibri" panose="020F0502020204030204" pitchFamily="34" charset="0"/>
+                      </a:endParaRPr>
+                    </a:p>
+                  </a:txBody>
+                  <a:tcPr marL="9525" marR="9525" marT="9525" marB="0" anchor="b"/>
+                </a:tc>
+                <a:tc>
+                  <a:txBody>
+                    <a:bodyPr/>
+                    <a:lstStyle/>
+                    <a:p>
+                      <a:pPr algn="r" fontAlgn="b"/>
+                      <a:r>
+                        <a:rPr lang="en-GB" sz="1100" u="none" strike="noStrike">
+                          <a:effectLst/>
+                        </a:rPr>
+                        <a:t>2.7x</a:t>
+                      </a:r>
+                      <a:endParaRPr lang="en-GB" sz="1100" b="0" i="0" u="none" strike="noStrike">
+                        <a:solidFill>
+                          <a:srgbClr val="000000"/>
+                        </a:solidFill>
+                        <a:effectLst/>
+                        <a:latin typeface="Calibri" panose="020F0502020204030204" pitchFamily="34" charset="0"/>
+                      </a:endParaRPr>
+                    </a:p>
+                  </a:txBody>
+                  <a:tcPr marL="9525" marR="9525" marT="9525" marB="0" anchor="b"/>
+                </a:tc>
+                <a:extLst>
+                  <a:ext uri="{0D108BD9-81ED-4DB2-BD59-A6C34878D82A}">
+                    <a16:rowId xmlns:a16="http://schemas.microsoft.com/office/drawing/2014/main" val="178488229"/>
+                  </a:ext>
+                </a:extLst>
+              </a:tr>
+              <a:tr h="190500">
+                <a:tc>
+                  <a:txBody>
+                    <a:bodyPr/>
+                    <a:lstStyle/>
+                    <a:p>
+                      <a:pPr algn="l" fontAlgn="b"/>
+                      <a:r>
+                        <a:rPr lang="en-GB" sz="1100" u="none" strike="noStrike">
+                          <a:effectLst/>
+                        </a:rPr>
+                        <a:t>Other</a:t>
+                      </a:r>
+                      <a:endParaRPr lang="en-GB" sz="1100" b="0" i="0" u="none" strike="noStrike">
+                        <a:solidFill>
+                          <a:srgbClr val="000000"/>
+                        </a:solidFill>
+                        <a:effectLst/>
+                        <a:latin typeface="Calibri" panose="020F0502020204030204" pitchFamily="34" charset="0"/>
+                      </a:endParaRPr>
+                    </a:p>
+                  </a:txBody>
+                  <a:tcPr marL="9525" marR="9525" marT="9525" marB="0" anchor="b">
+                    <a:lnB w="12700" cap="flat" cmpd="sng" algn="ctr">
+                      <a:solidFill>
+                        <a:schemeClr val="tx1"/>
+                      </a:solidFill>
+                      <a:prstDash val="solid"/>
+                      <a:round/>
+                      <a:headEnd type="none" w="med" len="med"/>
+                      <a:tailEnd type="none" w="med" len="med"/>
+                    </a:lnB>
+                  </a:tcPr>
+                </a:tc>
+                <a:tc>
+                  <a:txBody>
+                    <a:bodyPr/>
+                    <a:lstStyle/>
+                    <a:p>
+                      <a:pPr algn="r" fontAlgn="b"/>
+                      <a:r>
+                        <a:rPr lang="en-GB" sz="1100" u="none" strike="noStrike">
+                          <a:effectLst/>
+                        </a:rPr>
+                        <a:t>1,038</a:t>
+                      </a:r>
+                      <a:endParaRPr lang="en-GB" sz="1100" b="0" i="0" u="none" strike="noStrike">
+                        <a:solidFill>
+                          <a:srgbClr val="000000"/>
+                        </a:solidFill>
+                        <a:effectLst/>
+                        <a:latin typeface="Calibri" panose="020F0502020204030204" pitchFamily="34" charset="0"/>
+                      </a:endParaRPr>
+                    </a:p>
+                  </a:txBody>
+                  <a:tcPr marL="9525" marR="9525" marT="9525" marB="0" anchor="b">
+                    <a:lnB w="12700" cap="flat" cmpd="sng" algn="ctr">
+                      <a:solidFill>
+                        <a:schemeClr val="tx1"/>
+                      </a:solidFill>
+                      <a:prstDash val="solid"/>
+                      <a:round/>
+                      <a:headEnd type="none" w="med" len="med"/>
+                      <a:tailEnd type="none" w="med" len="med"/>
+                    </a:lnB>
+                  </a:tcPr>
+                </a:tc>
+                <a:tc>
+                  <a:txBody>
+                    <a:bodyPr/>
+                    <a:lstStyle/>
+                    <a:p>
+                      <a:pPr algn="r" fontAlgn="b"/>
+                      <a:r>
+                        <a:rPr lang="en-GB" sz="1100" u="none" strike="noStrike" dirty="0">
+                          <a:effectLst/>
+                        </a:rPr>
+                        <a:t>2.3x</a:t>
+                      </a:r>
+                      <a:endParaRPr lang="en-GB" sz="1100" b="0" i="0" u="none" strike="noStrike" dirty="0">
+                        <a:solidFill>
+                          <a:srgbClr val="000000"/>
+                        </a:solidFill>
+                        <a:effectLst/>
+                        <a:latin typeface="Calibri" panose="020F0502020204030204" pitchFamily="34" charset="0"/>
+                      </a:endParaRPr>
+                    </a:p>
+                  </a:txBody>
+                  <a:tcPr marL="9525" marR="9525" marT="9525" marB="0" anchor="b">
+                    <a:lnB w="12700" cap="flat" cmpd="sng" algn="ctr">
+                      <a:solidFill>
+                        <a:schemeClr val="tx1"/>
+                      </a:solidFill>
+                      <a:prstDash val="solid"/>
+                      <a:round/>
+                      <a:headEnd type="none" w="med" len="med"/>
+                      <a:tailEnd type="none" w="med" len="med"/>
+                    </a:lnB>
+                  </a:tcPr>
+                </a:tc>
+                <a:tc>
+                  <a:txBody>
+                    <a:bodyPr/>
+                    <a:lstStyle/>
+                    <a:p>
+                      <a:pPr algn="r" fontAlgn="b"/>
+                      <a:r>
+                        <a:rPr lang="en-GB" sz="1100" u="none" strike="noStrike" dirty="0">
+                          <a:effectLst/>
+                        </a:rPr>
+                        <a:t>2.8x</a:t>
+                      </a:r>
+                      <a:endParaRPr lang="en-GB" sz="1100" b="0" i="0" u="none" strike="noStrike" dirty="0">
+                        <a:solidFill>
+                          <a:srgbClr val="000000"/>
+                        </a:solidFill>
+                        <a:effectLst/>
+                        <a:latin typeface="Calibri" panose="020F0502020204030204" pitchFamily="34" charset="0"/>
+                      </a:endParaRPr>
+                    </a:p>
+                  </a:txBody>
+                  <a:tcPr marL="9525" marR="9525" marT="9525" marB="0" anchor="b">
+                    <a:lnB w="12700" cap="flat" cmpd="sng" algn="ctr">
+                      <a:solidFill>
+                        <a:schemeClr val="tx1"/>
+                      </a:solidFill>
+                      <a:prstDash val="solid"/>
+                      <a:round/>
+                      <a:headEnd type="none" w="med" len="med"/>
+                      <a:tailEnd type="none" w="med" len="med"/>
+                    </a:lnB>
+                  </a:tcPr>
+                </a:tc>
+                <a:extLst>
+                  <a:ext uri="{0D108BD9-81ED-4DB2-BD59-A6C34878D82A}">
+                    <a16:rowId xmlns:a16="http://schemas.microsoft.com/office/drawing/2014/main" val="4016358023"/>
+                  </a:ext>
+                </a:extLst>
+              </a:tr>
+            </a:tbl>
+          </a:graphicData>
+        </a:graphic>
+      </p:graphicFrame>
+      <p:sp>
+        <p:nvSpPr>
+          <p:cNvPr id="35" name="Rectangle 34">
+            <a:extLst>
+              <a:ext uri="{FF2B5EF4-FFF2-40B4-BE49-F238E27FC236}">
+                <a16:creationId xmlns:a16="http://schemas.microsoft.com/office/drawing/2014/main" id="{42BDED8B-2F02-D84C-B8A6-5525011A3414}"/>
+              </a:ext>
+            </a:extLst>
+          </p:cNvPr>
+          <p:cNvSpPr/>
+          <p:nvPr/>
+        </p:nvSpPr>
+        <p:spPr>
+          <a:xfrm>
+            <a:off x="7901760" y="6110348"/>
+            <a:ext cx="4059938" cy="600164"/>
+          </a:xfrm>
+          <a:prstGeom prst="rect">
+            <a:avLst/>
+          </a:prstGeom>
+        </p:spPr>
+        <p:txBody>
+          <a:bodyPr wrap="square">
+            <a:spAutoFit/>
+          </a:bodyPr>
+          <a:lstStyle/>
+          <a:p>
+            <a:r>
+              <a:rPr lang="en-GB" sz="1100" dirty="0">
+                <a:latin typeface="Calibri" panose="020F0502020204030204" pitchFamily="34" charset="0"/>
+                <a:cs typeface="Calibri" panose="020F0502020204030204" pitchFamily="34" charset="0"/>
+              </a:rPr>
+              <a:t>The number of male and female deaths between 20/03 and 07/05 were more than twice the number expected given historical trends in mortality and almost four times higher among Black males.</a:t>
+            </a:r>
+          </a:p>
+        </p:txBody>
+      </p:sp>
+    </p:spTree>
+    <p:extLst>
+      <p:ext uri="{BB962C8B-B14F-4D97-AF65-F5344CB8AC3E}">
+        <p14:creationId xmlns:p14="http://schemas.microsoft.com/office/powerpoint/2010/main" val="131715595"/>
       </p:ext>
     </p:extLst>
   </p:cSld>

</xml_diff>